<commit_message>
updated research with latest findings
</commit_message>
<xml_diff>
--- a/Results April7-2023/Documentation/diagrams.pptx
+++ b/Results April7-2023/Documentation/diagrams.pptx
@@ -7,6 +7,7 @@
   <p:sldIdLst>
     <p:sldId id="256" r:id="rId2"/>
     <p:sldId id="257" r:id="rId3"/>
+    <p:sldId id="258" r:id="rId4"/>
   </p:sldIdLst>
   <p:sldSz cx="12192000" cy="6858000"/>
   <p:notesSz cx="6858000" cy="9144000"/>
@@ -105,6 +106,11 @@
       </a:defRPr>
     </a:lvl9pPr>
   </p:defaultTextStyle>
+  <p:extLst>
+    <p:ext uri="{EFAFB233-063F-42B5-8137-9DF3F51BA10A}">
+      <p15:sldGuideLst xmlns:p15="http://schemas.microsoft.com/office/powerpoint/2012/main"/>
+    </p:ext>
+  </p:extLst>
 </p:presentation>
 </file>
 
@@ -255,7 +261,7 @@
           <a:p>
             <a:fld id="{C65DFA68-ED05-459F-A67B-C3167FA5D309}" type="datetimeFigureOut">
               <a:rPr lang="en-GB" smtClean="0"/>
-              <a:t>08/04/2023</a:t>
+              <a:t>13/05/2023</a:t>
             </a:fld>
             <a:endParaRPr lang="en-GB"/>
           </a:p>
@@ -453,7 +459,7 @@
           <a:p>
             <a:fld id="{C65DFA68-ED05-459F-A67B-C3167FA5D309}" type="datetimeFigureOut">
               <a:rPr lang="en-GB" smtClean="0"/>
-              <a:t>08/04/2023</a:t>
+              <a:t>13/05/2023</a:t>
             </a:fld>
             <a:endParaRPr lang="en-GB"/>
           </a:p>
@@ -661,7 +667,7 @@
           <a:p>
             <a:fld id="{C65DFA68-ED05-459F-A67B-C3167FA5D309}" type="datetimeFigureOut">
               <a:rPr lang="en-GB" smtClean="0"/>
-              <a:t>08/04/2023</a:t>
+              <a:t>13/05/2023</a:t>
             </a:fld>
             <a:endParaRPr lang="en-GB"/>
           </a:p>
@@ -859,7 +865,7 @@
           <a:p>
             <a:fld id="{C65DFA68-ED05-459F-A67B-C3167FA5D309}" type="datetimeFigureOut">
               <a:rPr lang="en-GB" smtClean="0"/>
-              <a:t>08/04/2023</a:t>
+              <a:t>13/05/2023</a:t>
             </a:fld>
             <a:endParaRPr lang="en-GB"/>
           </a:p>
@@ -1134,7 +1140,7 @@
           <a:p>
             <a:fld id="{C65DFA68-ED05-459F-A67B-C3167FA5D309}" type="datetimeFigureOut">
               <a:rPr lang="en-GB" smtClean="0"/>
-              <a:t>08/04/2023</a:t>
+              <a:t>13/05/2023</a:t>
             </a:fld>
             <a:endParaRPr lang="en-GB"/>
           </a:p>
@@ -1399,7 +1405,7 @@
           <a:p>
             <a:fld id="{C65DFA68-ED05-459F-A67B-C3167FA5D309}" type="datetimeFigureOut">
               <a:rPr lang="en-GB" smtClean="0"/>
-              <a:t>08/04/2023</a:t>
+              <a:t>13/05/2023</a:t>
             </a:fld>
             <a:endParaRPr lang="en-GB"/>
           </a:p>
@@ -1811,7 +1817,7 @@
           <a:p>
             <a:fld id="{C65DFA68-ED05-459F-A67B-C3167FA5D309}" type="datetimeFigureOut">
               <a:rPr lang="en-GB" smtClean="0"/>
-              <a:t>08/04/2023</a:t>
+              <a:t>13/05/2023</a:t>
             </a:fld>
             <a:endParaRPr lang="en-GB"/>
           </a:p>
@@ -1952,7 +1958,7 @@
           <a:p>
             <a:fld id="{C65DFA68-ED05-459F-A67B-C3167FA5D309}" type="datetimeFigureOut">
               <a:rPr lang="en-GB" smtClean="0"/>
-              <a:t>08/04/2023</a:t>
+              <a:t>13/05/2023</a:t>
             </a:fld>
             <a:endParaRPr lang="en-GB"/>
           </a:p>
@@ -2065,7 +2071,7 @@
           <a:p>
             <a:fld id="{C65DFA68-ED05-459F-A67B-C3167FA5D309}" type="datetimeFigureOut">
               <a:rPr lang="en-GB" smtClean="0"/>
-              <a:t>08/04/2023</a:t>
+              <a:t>13/05/2023</a:t>
             </a:fld>
             <a:endParaRPr lang="en-GB"/>
           </a:p>
@@ -2376,7 +2382,7 @@
           <a:p>
             <a:fld id="{C65DFA68-ED05-459F-A67B-C3167FA5D309}" type="datetimeFigureOut">
               <a:rPr lang="en-GB" smtClean="0"/>
-              <a:t>08/04/2023</a:t>
+              <a:t>13/05/2023</a:t>
             </a:fld>
             <a:endParaRPr lang="en-GB"/>
           </a:p>
@@ -2664,7 +2670,7 @@
           <a:p>
             <a:fld id="{C65DFA68-ED05-459F-A67B-C3167FA5D309}" type="datetimeFigureOut">
               <a:rPr lang="en-GB" smtClean="0"/>
-              <a:t>08/04/2023</a:t>
+              <a:t>13/05/2023</a:t>
             </a:fld>
             <a:endParaRPr lang="en-GB"/>
           </a:p>
@@ -2905,7 +2911,7 @@
           <a:p>
             <a:fld id="{C65DFA68-ED05-459F-A67B-C3167FA5D309}" type="datetimeFigureOut">
               <a:rPr lang="en-GB" smtClean="0"/>
-              <a:t>08/04/2023</a:t>
+              <a:t>13/05/2023</a:t>
             </a:fld>
             <a:endParaRPr lang="en-GB"/>
           </a:p>
@@ -5198,6 +5204,3802 @@
 </p:sld>
 </file>
 
+<file path=ppt/slides/slide3.xml><?xml version="1.0" encoding="utf-8"?>
+<p:sld xmlns:a="http://schemas.openxmlformats.org/drawingml/2006/main" xmlns:r="http://schemas.openxmlformats.org/officeDocument/2006/relationships" xmlns:p="http://schemas.openxmlformats.org/presentationml/2006/main">
+  <p:cSld>
+    <p:spTree>
+      <p:nvGrpSpPr>
+        <p:cNvPr id="1" name=""/>
+        <p:cNvGrpSpPr/>
+        <p:nvPr/>
+      </p:nvGrpSpPr>
+      <p:grpSpPr>
+        <a:xfrm>
+          <a:off x="0" y="0"/>
+          <a:ext cx="0" cy="0"/>
+          <a:chOff x="0" y="0"/>
+          <a:chExt cx="0" cy="0"/>
+        </a:xfrm>
+      </p:grpSpPr>
+      <p:sp>
+        <p:nvSpPr>
+          <p:cNvPr id="4" name="Oval 3">
+            <a:extLst>
+              <a:ext uri="{FF2B5EF4-FFF2-40B4-BE49-F238E27FC236}">
+                <a16:creationId xmlns:a16="http://schemas.microsoft.com/office/drawing/2014/main" id="{217DE6D5-031A-F6B7-7FBE-A25FB5737A9B}"/>
+              </a:ext>
+            </a:extLst>
+          </p:cNvPr>
+          <p:cNvSpPr/>
+          <p:nvPr/>
+        </p:nvSpPr>
+        <p:spPr>
+          <a:xfrm>
+            <a:off x="5217783" y="413714"/>
+            <a:ext cx="1311653" cy="520549"/>
+          </a:xfrm>
+          <a:prstGeom prst="ellipse">
+            <a:avLst/>
+          </a:prstGeom>
+          <a:noFill/>
+          <a:ln>
+            <a:solidFill>
+              <a:schemeClr val="tx1"/>
+            </a:solidFill>
+          </a:ln>
+        </p:spPr>
+        <p:style>
+          <a:lnRef idx="2">
+            <a:schemeClr val="accent1">
+              <a:shade val="50000"/>
+            </a:schemeClr>
+          </a:lnRef>
+          <a:fillRef idx="1">
+            <a:schemeClr val="accent1"/>
+          </a:fillRef>
+          <a:effectRef idx="0">
+            <a:schemeClr val="accent1"/>
+          </a:effectRef>
+          <a:fontRef idx="minor">
+            <a:schemeClr val="lt1"/>
+          </a:fontRef>
+        </p:style>
+        <p:txBody>
+          <a:bodyPr rtlCol="0" anchor="ctr"/>
+          <a:lstStyle/>
+          <a:p>
+            <a:pPr algn="ctr"/>
+            <a:r>
+              <a:rPr lang="en-GB" sz="1000" dirty="0">
+                <a:solidFill>
+                  <a:schemeClr val="tx1"/>
+                </a:solidFill>
+              </a:rPr>
+              <a:t>Time to Maturity </a:t>
+            </a:r>
+          </a:p>
+          <a:p>
+            <a:pPr algn="ctr"/>
+            <a:r>
+              <a:rPr lang="en-GB" sz="1000" dirty="0">
+                <a:solidFill>
+                  <a:schemeClr val="tx1"/>
+                </a:solidFill>
+              </a:rPr>
+              <a:t>&lt; 98.4</a:t>
+            </a:r>
+          </a:p>
+        </p:txBody>
+      </p:sp>
+      <p:cxnSp>
+        <p:nvCxnSpPr>
+          <p:cNvPr id="5" name="Straight Arrow Connector 4">
+            <a:extLst>
+              <a:ext uri="{FF2B5EF4-FFF2-40B4-BE49-F238E27FC236}">
+                <a16:creationId xmlns:a16="http://schemas.microsoft.com/office/drawing/2014/main" id="{9EB67A2E-0F05-E2AE-E22A-D826E0EE5944}"/>
+              </a:ext>
+            </a:extLst>
+          </p:cNvPr>
+          <p:cNvCxnSpPr>
+            <a:cxnSpLocks/>
+          </p:cNvCxnSpPr>
+          <p:nvPr/>
+        </p:nvCxnSpPr>
+        <p:spPr>
+          <a:xfrm flipH="1">
+            <a:off x="5279367" y="992742"/>
+            <a:ext cx="294090" cy="383699"/>
+          </a:xfrm>
+          <a:prstGeom prst="straightConnector1">
+            <a:avLst/>
+          </a:prstGeom>
+          <a:ln>
+            <a:solidFill>
+              <a:schemeClr val="tx1"/>
+            </a:solidFill>
+            <a:tailEnd type="triangle"/>
+          </a:ln>
+        </p:spPr>
+        <p:style>
+          <a:lnRef idx="1">
+            <a:schemeClr val="accent1"/>
+          </a:lnRef>
+          <a:fillRef idx="0">
+            <a:schemeClr val="accent1"/>
+          </a:fillRef>
+          <a:effectRef idx="0">
+            <a:schemeClr val="accent1"/>
+          </a:effectRef>
+          <a:fontRef idx="minor">
+            <a:schemeClr val="tx1"/>
+          </a:fontRef>
+        </p:style>
+      </p:cxnSp>
+      <p:cxnSp>
+        <p:nvCxnSpPr>
+          <p:cNvPr id="7" name="Straight Arrow Connector 6">
+            <a:extLst>
+              <a:ext uri="{FF2B5EF4-FFF2-40B4-BE49-F238E27FC236}">
+                <a16:creationId xmlns:a16="http://schemas.microsoft.com/office/drawing/2014/main" id="{B0878D2A-B649-B6BD-A0F6-7822F12C1685}"/>
+              </a:ext>
+            </a:extLst>
+          </p:cNvPr>
+          <p:cNvCxnSpPr>
+            <a:cxnSpLocks/>
+          </p:cNvCxnSpPr>
+          <p:nvPr/>
+        </p:nvCxnSpPr>
+        <p:spPr>
+          <a:xfrm>
+            <a:off x="6234566" y="998949"/>
+            <a:ext cx="387396" cy="383699"/>
+          </a:xfrm>
+          <a:prstGeom prst="straightConnector1">
+            <a:avLst/>
+          </a:prstGeom>
+          <a:ln>
+            <a:solidFill>
+              <a:schemeClr val="tx1"/>
+            </a:solidFill>
+            <a:tailEnd type="triangle"/>
+          </a:ln>
+        </p:spPr>
+        <p:style>
+          <a:lnRef idx="1">
+            <a:schemeClr val="accent1"/>
+          </a:lnRef>
+          <a:fillRef idx="0">
+            <a:schemeClr val="accent1"/>
+          </a:fillRef>
+          <a:effectRef idx="0">
+            <a:schemeClr val="accent1"/>
+          </a:effectRef>
+          <a:fontRef idx="minor">
+            <a:schemeClr val="tx1"/>
+          </a:fontRef>
+        </p:style>
+      </p:cxnSp>
+      <p:sp>
+        <p:nvSpPr>
+          <p:cNvPr id="9" name="TextBox 8">
+            <a:extLst>
+              <a:ext uri="{FF2B5EF4-FFF2-40B4-BE49-F238E27FC236}">
+                <a16:creationId xmlns:a16="http://schemas.microsoft.com/office/drawing/2014/main" id="{77B7FAE0-A894-A158-A0C9-E2A4E79E736A}"/>
+              </a:ext>
+            </a:extLst>
+          </p:cNvPr>
+          <p:cNvSpPr txBox="1"/>
+          <p:nvPr/>
+        </p:nvSpPr>
+        <p:spPr>
+          <a:xfrm>
+            <a:off x="6335476" y="998949"/>
+            <a:ext cx="369012" cy="246221"/>
+          </a:xfrm>
+          <a:prstGeom prst="rect">
+            <a:avLst/>
+          </a:prstGeom>
+          <a:noFill/>
+        </p:spPr>
+        <p:txBody>
+          <a:bodyPr wrap="none" rtlCol="0">
+            <a:spAutoFit/>
+          </a:bodyPr>
+          <a:lstStyle/>
+          <a:p>
+            <a:r>
+              <a:rPr lang="en-GB" sz="1000" dirty="0"/>
+              <a:t>YES</a:t>
+            </a:r>
+          </a:p>
+        </p:txBody>
+      </p:sp>
+      <p:sp>
+        <p:nvSpPr>
+          <p:cNvPr id="10" name="TextBox 9">
+            <a:extLst>
+              <a:ext uri="{FF2B5EF4-FFF2-40B4-BE49-F238E27FC236}">
+                <a16:creationId xmlns:a16="http://schemas.microsoft.com/office/drawing/2014/main" id="{BA32FB2B-8BB8-3A88-DFA5-5BC489A8EDEA}"/>
+              </a:ext>
+            </a:extLst>
+          </p:cNvPr>
+          <p:cNvSpPr txBox="1"/>
+          <p:nvPr/>
+        </p:nvSpPr>
+        <p:spPr>
+          <a:xfrm>
+            <a:off x="5146618" y="1009994"/>
+            <a:ext cx="352982" cy="246221"/>
+          </a:xfrm>
+          <a:prstGeom prst="rect">
+            <a:avLst/>
+          </a:prstGeom>
+          <a:noFill/>
+        </p:spPr>
+        <p:txBody>
+          <a:bodyPr wrap="none" rtlCol="0">
+            <a:spAutoFit/>
+          </a:bodyPr>
+          <a:lstStyle/>
+          <a:p>
+            <a:r>
+              <a:rPr lang="en-GB" sz="1000" dirty="0"/>
+              <a:t>NO</a:t>
+            </a:r>
+          </a:p>
+        </p:txBody>
+      </p:sp>
+      <p:sp>
+        <p:nvSpPr>
+          <p:cNvPr id="11" name="Oval 10">
+            <a:extLst>
+              <a:ext uri="{FF2B5EF4-FFF2-40B4-BE49-F238E27FC236}">
+                <a16:creationId xmlns:a16="http://schemas.microsoft.com/office/drawing/2014/main" id="{211B1C3E-2734-2E08-07B4-A6959B0C4CE1}"/>
+              </a:ext>
+            </a:extLst>
+          </p:cNvPr>
+          <p:cNvSpPr/>
+          <p:nvPr/>
+        </p:nvSpPr>
+        <p:spPr>
+          <a:xfrm>
+            <a:off x="6480587" y="1376441"/>
+            <a:ext cx="1345720" cy="520549"/>
+          </a:xfrm>
+          <a:prstGeom prst="ellipse">
+            <a:avLst/>
+          </a:prstGeom>
+          <a:noFill/>
+          <a:ln>
+            <a:solidFill>
+              <a:schemeClr val="tx1"/>
+            </a:solidFill>
+          </a:ln>
+        </p:spPr>
+        <p:style>
+          <a:lnRef idx="2">
+            <a:schemeClr val="accent1">
+              <a:shade val="50000"/>
+            </a:schemeClr>
+          </a:lnRef>
+          <a:fillRef idx="1">
+            <a:schemeClr val="accent1"/>
+          </a:fillRef>
+          <a:effectRef idx="0">
+            <a:schemeClr val="accent1"/>
+          </a:effectRef>
+          <a:fontRef idx="minor">
+            <a:schemeClr val="lt1"/>
+          </a:fontRef>
+        </p:style>
+        <p:txBody>
+          <a:bodyPr rtlCol="0" anchor="ctr"/>
+          <a:lstStyle/>
+          <a:p>
+            <a:pPr algn="ctr"/>
+            <a:r>
+              <a:rPr lang="en-GB" sz="1050" dirty="0">
+                <a:solidFill>
+                  <a:schemeClr val="tx1"/>
+                </a:solidFill>
+              </a:rPr>
+              <a:t>Time to Maturity </a:t>
+            </a:r>
+          </a:p>
+          <a:p>
+            <a:pPr algn="ctr"/>
+            <a:r>
+              <a:rPr lang="en-GB" sz="1050" dirty="0">
+                <a:solidFill>
+                  <a:schemeClr val="tx1"/>
+                </a:solidFill>
+              </a:rPr>
+              <a:t>&lt; 94.6</a:t>
+            </a:r>
+          </a:p>
+        </p:txBody>
+      </p:sp>
+      <p:sp>
+        <p:nvSpPr>
+          <p:cNvPr id="13" name="Oval 12">
+            <a:extLst>
+              <a:ext uri="{FF2B5EF4-FFF2-40B4-BE49-F238E27FC236}">
+                <a16:creationId xmlns:a16="http://schemas.microsoft.com/office/drawing/2014/main" id="{541AADD1-605A-9F4E-3CAB-1481AEBA328D}"/>
+              </a:ext>
+            </a:extLst>
+          </p:cNvPr>
+          <p:cNvSpPr/>
+          <p:nvPr/>
+        </p:nvSpPr>
+        <p:spPr>
+          <a:xfrm>
+            <a:off x="4039778" y="1320936"/>
+            <a:ext cx="1345720" cy="520549"/>
+          </a:xfrm>
+          <a:prstGeom prst="ellipse">
+            <a:avLst/>
+          </a:prstGeom>
+          <a:noFill/>
+          <a:ln>
+            <a:solidFill>
+              <a:schemeClr val="tx1"/>
+            </a:solidFill>
+          </a:ln>
+        </p:spPr>
+        <p:style>
+          <a:lnRef idx="2">
+            <a:schemeClr val="accent1">
+              <a:shade val="50000"/>
+            </a:schemeClr>
+          </a:lnRef>
+          <a:fillRef idx="1">
+            <a:schemeClr val="accent1"/>
+          </a:fillRef>
+          <a:effectRef idx="0">
+            <a:schemeClr val="accent1"/>
+          </a:effectRef>
+          <a:fontRef idx="minor">
+            <a:schemeClr val="lt1"/>
+          </a:fontRef>
+        </p:style>
+        <p:txBody>
+          <a:bodyPr rtlCol="0" anchor="ctr"/>
+          <a:lstStyle/>
+          <a:p>
+            <a:pPr algn="ctr"/>
+            <a:r>
+              <a:rPr lang="en-GB" sz="1050" dirty="0">
+                <a:solidFill>
+                  <a:schemeClr val="tx1"/>
+                </a:solidFill>
+              </a:rPr>
+              <a:t>1Y Gov Yield </a:t>
+            </a:r>
+          </a:p>
+          <a:p>
+            <a:pPr algn="ctr"/>
+            <a:r>
+              <a:rPr lang="en-GB" sz="1050" dirty="0">
+                <a:solidFill>
+                  <a:schemeClr val="tx1"/>
+                </a:solidFill>
+              </a:rPr>
+              <a:t>&lt; 0.29</a:t>
+            </a:r>
+          </a:p>
+        </p:txBody>
+      </p:sp>
+      <p:cxnSp>
+        <p:nvCxnSpPr>
+          <p:cNvPr id="14" name="Straight Arrow Connector 13">
+            <a:extLst>
+              <a:ext uri="{FF2B5EF4-FFF2-40B4-BE49-F238E27FC236}">
+                <a16:creationId xmlns:a16="http://schemas.microsoft.com/office/drawing/2014/main" id="{ADE4B4C1-B11B-D810-989B-BE89F7874DA0}"/>
+              </a:ext>
+            </a:extLst>
+          </p:cNvPr>
+          <p:cNvCxnSpPr>
+            <a:cxnSpLocks/>
+          </p:cNvCxnSpPr>
+          <p:nvPr/>
+        </p:nvCxnSpPr>
+        <p:spPr>
+          <a:xfrm flipH="1">
+            <a:off x="4074479" y="1879738"/>
+            <a:ext cx="294090" cy="383699"/>
+          </a:xfrm>
+          <a:prstGeom prst="straightConnector1">
+            <a:avLst/>
+          </a:prstGeom>
+          <a:ln>
+            <a:solidFill>
+              <a:schemeClr val="tx1"/>
+            </a:solidFill>
+            <a:tailEnd type="triangle"/>
+          </a:ln>
+        </p:spPr>
+        <p:style>
+          <a:lnRef idx="1">
+            <a:schemeClr val="accent1"/>
+          </a:lnRef>
+          <a:fillRef idx="0">
+            <a:schemeClr val="accent1"/>
+          </a:fillRef>
+          <a:effectRef idx="0">
+            <a:schemeClr val="accent1"/>
+          </a:effectRef>
+          <a:fontRef idx="minor">
+            <a:schemeClr val="tx1"/>
+          </a:fontRef>
+        </p:style>
+      </p:cxnSp>
+      <p:cxnSp>
+        <p:nvCxnSpPr>
+          <p:cNvPr id="15" name="Straight Arrow Connector 14">
+            <a:extLst>
+              <a:ext uri="{FF2B5EF4-FFF2-40B4-BE49-F238E27FC236}">
+                <a16:creationId xmlns:a16="http://schemas.microsoft.com/office/drawing/2014/main" id="{05F8C7B8-99AF-32F8-16B8-19682EFC5ACD}"/>
+              </a:ext>
+            </a:extLst>
+          </p:cNvPr>
+          <p:cNvCxnSpPr>
+            <a:cxnSpLocks/>
+          </p:cNvCxnSpPr>
+          <p:nvPr/>
+        </p:nvCxnSpPr>
+        <p:spPr>
+          <a:xfrm>
+            <a:off x="5029678" y="1885945"/>
+            <a:ext cx="387396" cy="383699"/>
+          </a:xfrm>
+          <a:prstGeom prst="straightConnector1">
+            <a:avLst/>
+          </a:prstGeom>
+          <a:ln>
+            <a:solidFill>
+              <a:schemeClr val="tx1"/>
+            </a:solidFill>
+            <a:tailEnd type="triangle"/>
+          </a:ln>
+        </p:spPr>
+        <p:style>
+          <a:lnRef idx="1">
+            <a:schemeClr val="accent1"/>
+          </a:lnRef>
+          <a:fillRef idx="0">
+            <a:schemeClr val="accent1"/>
+          </a:fillRef>
+          <a:effectRef idx="0">
+            <a:schemeClr val="accent1"/>
+          </a:effectRef>
+          <a:fontRef idx="minor">
+            <a:schemeClr val="tx1"/>
+          </a:fontRef>
+        </p:style>
+      </p:cxnSp>
+      <p:sp>
+        <p:nvSpPr>
+          <p:cNvPr id="16" name="TextBox 15">
+            <a:extLst>
+              <a:ext uri="{FF2B5EF4-FFF2-40B4-BE49-F238E27FC236}">
+                <a16:creationId xmlns:a16="http://schemas.microsoft.com/office/drawing/2014/main" id="{AB9970E8-9981-571A-7000-3E15C5018E8C}"/>
+              </a:ext>
+            </a:extLst>
+          </p:cNvPr>
+          <p:cNvSpPr txBox="1"/>
+          <p:nvPr/>
+        </p:nvSpPr>
+        <p:spPr>
+          <a:xfrm>
+            <a:off x="5130588" y="1885945"/>
+            <a:ext cx="369012" cy="246221"/>
+          </a:xfrm>
+          <a:prstGeom prst="rect">
+            <a:avLst/>
+          </a:prstGeom>
+          <a:noFill/>
+        </p:spPr>
+        <p:txBody>
+          <a:bodyPr wrap="none" rtlCol="0">
+            <a:spAutoFit/>
+          </a:bodyPr>
+          <a:lstStyle/>
+          <a:p>
+            <a:r>
+              <a:rPr lang="en-GB" sz="1000" dirty="0"/>
+              <a:t>YES</a:t>
+            </a:r>
+          </a:p>
+        </p:txBody>
+      </p:sp>
+      <p:sp>
+        <p:nvSpPr>
+          <p:cNvPr id="17" name="TextBox 16">
+            <a:extLst>
+              <a:ext uri="{FF2B5EF4-FFF2-40B4-BE49-F238E27FC236}">
+                <a16:creationId xmlns:a16="http://schemas.microsoft.com/office/drawing/2014/main" id="{DA02C5AA-355E-C3CA-3F21-8FC02AFFFF48}"/>
+              </a:ext>
+            </a:extLst>
+          </p:cNvPr>
+          <p:cNvSpPr txBox="1"/>
+          <p:nvPr/>
+        </p:nvSpPr>
+        <p:spPr>
+          <a:xfrm>
+            <a:off x="3941730" y="1896990"/>
+            <a:ext cx="352982" cy="246221"/>
+          </a:xfrm>
+          <a:prstGeom prst="rect">
+            <a:avLst/>
+          </a:prstGeom>
+          <a:noFill/>
+        </p:spPr>
+        <p:txBody>
+          <a:bodyPr wrap="none" rtlCol="0">
+            <a:spAutoFit/>
+          </a:bodyPr>
+          <a:lstStyle/>
+          <a:p>
+            <a:r>
+              <a:rPr lang="en-GB" sz="1000" dirty="0"/>
+              <a:t>NO</a:t>
+            </a:r>
+          </a:p>
+        </p:txBody>
+      </p:sp>
+      <p:pic>
+        <p:nvPicPr>
+          <p:cNvPr id="19" name="Graphic 18" descr="Leaf outline">
+            <a:extLst>
+              <a:ext uri="{FF2B5EF4-FFF2-40B4-BE49-F238E27FC236}">
+                <a16:creationId xmlns:a16="http://schemas.microsoft.com/office/drawing/2014/main" id="{19F41854-103C-D1CA-D67D-C9AAD352F21A}"/>
+              </a:ext>
+            </a:extLst>
+          </p:cNvPr>
+          <p:cNvPicPr>
+            <a:picLocks noChangeAspect="1"/>
+          </p:cNvPicPr>
+          <p:nvPr/>
+        </p:nvPicPr>
+        <p:blipFill>
+          <a:blip r:embed="rId2">
+            <a:extLst>
+              <a:ext uri="{28A0092B-C50C-407E-A947-70E740481C1C}">
+                <a14:useLocalDpi xmlns:a14="http://schemas.microsoft.com/office/drawing/2010/main" val="0"/>
+              </a:ext>
+              <a:ext uri="{96DAC541-7B7A-43D3-8B79-37D633B846F1}">
+                <asvg:svgBlip xmlns:asvg="http://schemas.microsoft.com/office/drawing/2016/SVG/main" r:embed="rId3"/>
+              </a:ext>
+            </a:extLst>
+          </a:blip>
+          <a:stretch>
+            <a:fillRect/>
+          </a:stretch>
+        </p:blipFill>
+        <p:spPr>
+          <a:xfrm>
+            <a:off x="5166874" y="2220244"/>
+            <a:ext cx="677174" cy="677174"/>
+          </a:xfrm>
+          <a:prstGeom prst="rect">
+            <a:avLst/>
+          </a:prstGeom>
+        </p:spPr>
+      </p:pic>
+      <p:sp>
+        <p:nvSpPr>
+          <p:cNvPr id="20" name="TextBox 19">
+            <a:extLst>
+              <a:ext uri="{FF2B5EF4-FFF2-40B4-BE49-F238E27FC236}">
+                <a16:creationId xmlns:a16="http://schemas.microsoft.com/office/drawing/2014/main" id="{87D5D7EB-765F-7426-1472-CFEABD9D3CAA}"/>
+              </a:ext>
+            </a:extLst>
+          </p:cNvPr>
+          <p:cNvSpPr txBox="1"/>
+          <p:nvPr/>
+        </p:nvSpPr>
+        <p:spPr>
+          <a:xfrm>
+            <a:off x="5233044" y="2322140"/>
+            <a:ext cx="518091" cy="246221"/>
+          </a:xfrm>
+          <a:prstGeom prst="rect">
+            <a:avLst/>
+          </a:prstGeom>
+          <a:noFill/>
+        </p:spPr>
+        <p:txBody>
+          <a:bodyPr wrap="none" rtlCol="0">
+            <a:spAutoFit/>
+          </a:bodyPr>
+          <a:lstStyle/>
+          <a:p>
+            <a:r>
+              <a:rPr lang="en-GB" sz="1000" dirty="0"/>
+              <a:t>-0.043</a:t>
+            </a:r>
+          </a:p>
+        </p:txBody>
+      </p:sp>
+      <p:sp>
+        <p:nvSpPr>
+          <p:cNvPr id="21" name="Oval 20">
+            <a:extLst>
+              <a:ext uri="{FF2B5EF4-FFF2-40B4-BE49-F238E27FC236}">
+                <a16:creationId xmlns:a16="http://schemas.microsoft.com/office/drawing/2014/main" id="{58C69704-FF53-84CD-AD4F-6268A84BE5CA}"/>
+              </a:ext>
+            </a:extLst>
+          </p:cNvPr>
+          <p:cNvSpPr/>
+          <p:nvPr/>
+        </p:nvSpPr>
+        <p:spPr>
+          <a:xfrm>
+            <a:off x="3318850" y="2298557"/>
+            <a:ext cx="1345720" cy="520549"/>
+          </a:xfrm>
+          <a:prstGeom prst="ellipse">
+            <a:avLst/>
+          </a:prstGeom>
+          <a:noFill/>
+          <a:ln>
+            <a:solidFill>
+              <a:schemeClr val="tx1"/>
+            </a:solidFill>
+          </a:ln>
+        </p:spPr>
+        <p:style>
+          <a:lnRef idx="2">
+            <a:schemeClr val="accent1">
+              <a:shade val="50000"/>
+            </a:schemeClr>
+          </a:lnRef>
+          <a:fillRef idx="1">
+            <a:schemeClr val="accent1"/>
+          </a:fillRef>
+          <a:effectRef idx="0">
+            <a:schemeClr val="accent1"/>
+          </a:effectRef>
+          <a:fontRef idx="minor">
+            <a:schemeClr val="lt1"/>
+          </a:fontRef>
+        </p:style>
+        <p:txBody>
+          <a:bodyPr rtlCol="0" anchor="ctr"/>
+          <a:lstStyle/>
+          <a:p>
+            <a:pPr algn="ctr"/>
+            <a:r>
+              <a:rPr lang="en-GB" sz="1050" dirty="0">
+                <a:solidFill>
+                  <a:schemeClr val="tx1"/>
+                </a:solidFill>
+              </a:rPr>
+              <a:t>FTSE 100 </a:t>
+            </a:r>
+            <a:r>
+              <a:rPr lang="en-GB" sz="1050" dirty="0" err="1">
+                <a:solidFill>
+                  <a:schemeClr val="tx1"/>
+                </a:solidFill>
+              </a:rPr>
+              <a:t>StDev</a:t>
+            </a:r>
+            <a:endParaRPr lang="en-GB" sz="1050" dirty="0">
+              <a:solidFill>
+                <a:schemeClr val="tx1"/>
+              </a:solidFill>
+            </a:endParaRPr>
+          </a:p>
+          <a:p>
+            <a:pPr algn="ctr"/>
+            <a:r>
+              <a:rPr lang="en-GB" sz="1050" dirty="0">
+                <a:solidFill>
+                  <a:schemeClr val="tx1"/>
+                </a:solidFill>
+              </a:rPr>
+              <a:t>&lt; 0.503</a:t>
+            </a:r>
+          </a:p>
+        </p:txBody>
+      </p:sp>
+      <p:cxnSp>
+        <p:nvCxnSpPr>
+          <p:cNvPr id="22" name="Straight Arrow Connector 21">
+            <a:extLst>
+              <a:ext uri="{FF2B5EF4-FFF2-40B4-BE49-F238E27FC236}">
+                <a16:creationId xmlns:a16="http://schemas.microsoft.com/office/drawing/2014/main" id="{C5B2B1C8-4EEC-244F-BAAD-40C7345355C2}"/>
+              </a:ext>
+            </a:extLst>
+          </p:cNvPr>
+          <p:cNvCxnSpPr>
+            <a:cxnSpLocks/>
+          </p:cNvCxnSpPr>
+          <p:nvPr/>
+        </p:nvCxnSpPr>
+        <p:spPr>
+          <a:xfrm flipH="1">
+            <a:off x="3354965" y="2952550"/>
+            <a:ext cx="294090" cy="383699"/>
+          </a:xfrm>
+          <a:prstGeom prst="straightConnector1">
+            <a:avLst/>
+          </a:prstGeom>
+          <a:ln>
+            <a:solidFill>
+              <a:schemeClr val="tx1"/>
+            </a:solidFill>
+            <a:tailEnd type="triangle"/>
+          </a:ln>
+        </p:spPr>
+        <p:style>
+          <a:lnRef idx="1">
+            <a:schemeClr val="accent1"/>
+          </a:lnRef>
+          <a:fillRef idx="0">
+            <a:schemeClr val="accent1"/>
+          </a:fillRef>
+          <a:effectRef idx="0">
+            <a:schemeClr val="accent1"/>
+          </a:effectRef>
+          <a:fontRef idx="minor">
+            <a:schemeClr val="tx1"/>
+          </a:fontRef>
+        </p:style>
+      </p:cxnSp>
+      <p:cxnSp>
+        <p:nvCxnSpPr>
+          <p:cNvPr id="23" name="Straight Arrow Connector 22">
+            <a:extLst>
+              <a:ext uri="{FF2B5EF4-FFF2-40B4-BE49-F238E27FC236}">
+                <a16:creationId xmlns:a16="http://schemas.microsoft.com/office/drawing/2014/main" id="{47AEB2F0-3E2F-E703-EBF5-8CE1A1841541}"/>
+              </a:ext>
+            </a:extLst>
+          </p:cNvPr>
+          <p:cNvCxnSpPr>
+            <a:cxnSpLocks/>
+          </p:cNvCxnSpPr>
+          <p:nvPr/>
+        </p:nvCxnSpPr>
+        <p:spPr>
+          <a:xfrm>
+            <a:off x="4131467" y="2957059"/>
+            <a:ext cx="387396" cy="383699"/>
+          </a:xfrm>
+          <a:prstGeom prst="straightConnector1">
+            <a:avLst/>
+          </a:prstGeom>
+          <a:ln>
+            <a:solidFill>
+              <a:schemeClr val="tx1"/>
+            </a:solidFill>
+            <a:tailEnd type="triangle"/>
+          </a:ln>
+        </p:spPr>
+        <p:style>
+          <a:lnRef idx="1">
+            <a:schemeClr val="accent1"/>
+          </a:lnRef>
+          <a:fillRef idx="0">
+            <a:schemeClr val="accent1"/>
+          </a:fillRef>
+          <a:effectRef idx="0">
+            <a:schemeClr val="accent1"/>
+          </a:effectRef>
+          <a:fontRef idx="minor">
+            <a:schemeClr val="tx1"/>
+          </a:fontRef>
+        </p:style>
+      </p:cxnSp>
+      <p:sp>
+        <p:nvSpPr>
+          <p:cNvPr id="24" name="TextBox 23">
+            <a:extLst>
+              <a:ext uri="{FF2B5EF4-FFF2-40B4-BE49-F238E27FC236}">
+                <a16:creationId xmlns:a16="http://schemas.microsoft.com/office/drawing/2014/main" id="{B4D05B57-214A-EBEC-4812-1DB0C7AB1E71}"/>
+              </a:ext>
+            </a:extLst>
+          </p:cNvPr>
+          <p:cNvSpPr txBox="1"/>
+          <p:nvPr/>
+        </p:nvSpPr>
+        <p:spPr>
+          <a:xfrm>
+            <a:off x="4232377" y="2957059"/>
+            <a:ext cx="369012" cy="246221"/>
+          </a:xfrm>
+          <a:prstGeom prst="rect">
+            <a:avLst/>
+          </a:prstGeom>
+          <a:noFill/>
+        </p:spPr>
+        <p:txBody>
+          <a:bodyPr wrap="none" rtlCol="0">
+            <a:spAutoFit/>
+          </a:bodyPr>
+          <a:lstStyle/>
+          <a:p>
+            <a:r>
+              <a:rPr lang="en-GB" sz="1000" dirty="0"/>
+              <a:t>YES</a:t>
+            </a:r>
+          </a:p>
+        </p:txBody>
+      </p:sp>
+      <p:sp>
+        <p:nvSpPr>
+          <p:cNvPr id="25" name="TextBox 24">
+            <a:extLst>
+              <a:ext uri="{FF2B5EF4-FFF2-40B4-BE49-F238E27FC236}">
+                <a16:creationId xmlns:a16="http://schemas.microsoft.com/office/drawing/2014/main" id="{4D889E7C-8297-8CD6-0E90-741B45C871FB}"/>
+              </a:ext>
+            </a:extLst>
+          </p:cNvPr>
+          <p:cNvSpPr txBox="1"/>
+          <p:nvPr/>
+        </p:nvSpPr>
+        <p:spPr>
+          <a:xfrm>
+            <a:off x="3222216" y="2969802"/>
+            <a:ext cx="352982" cy="246221"/>
+          </a:xfrm>
+          <a:prstGeom prst="rect">
+            <a:avLst/>
+          </a:prstGeom>
+          <a:noFill/>
+        </p:spPr>
+        <p:txBody>
+          <a:bodyPr wrap="none" rtlCol="0">
+            <a:spAutoFit/>
+          </a:bodyPr>
+          <a:lstStyle/>
+          <a:p>
+            <a:r>
+              <a:rPr lang="en-GB" sz="1000" dirty="0"/>
+              <a:t>NO</a:t>
+            </a:r>
+          </a:p>
+        </p:txBody>
+      </p:sp>
+      <p:cxnSp>
+        <p:nvCxnSpPr>
+          <p:cNvPr id="28" name="Straight Arrow Connector 27">
+            <a:extLst>
+              <a:ext uri="{FF2B5EF4-FFF2-40B4-BE49-F238E27FC236}">
+                <a16:creationId xmlns:a16="http://schemas.microsoft.com/office/drawing/2014/main" id="{61D11621-5C8E-709E-EDA9-828DEAA7F574}"/>
+              </a:ext>
+            </a:extLst>
+          </p:cNvPr>
+          <p:cNvCxnSpPr>
+            <a:cxnSpLocks/>
+          </p:cNvCxnSpPr>
+          <p:nvPr/>
+        </p:nvCxnSpPr>
+        <p:spPr>
+          <a:xfrm flipH="1">
+            <a:off x="4212356" y="3971357"/>
+            <a:ext cx="294090" cy="383699"/>
+          </a:xfrm>
+          <a:prstGeom prst="straightConnector1">
+            <a:avLst/>
+          </a:prstGeom>
+          <a:ln>
+            <a:solidFill>
+              <a:schemeClr val="tx1"/>
+            </a:solidFill>
+            <a:tailEnd type="triangle"/>
+          </a:ln>
+        </p:spPr>
+        <p:style>
+          <a:lnRef idx="1">
+            <a:schemeClr val="accent1"/>
+          </a:lnRef>
+          <a:fillRef idx="0">
+            <a:schemeClr val="accent1"/>
+          </a:fillRef>
+          <a:effectRef idx="0">
+            <a:schemeClr val="accent1"/>
+          </a:effectRef>
+          <a:fontRef idx="minor">
+            <a:schemeClr val="tx1"/>
+          </a:fontRef>
+        </p:style>
+      </p:cxnSp>
+      <p:cxnSp>
+        <p:nvCxnSpPr>
+          <p:cNvPr id="29" name="Straight Arrow Connector 28">
+            <a:extLst>
+              <a:ext uri="{FF2B5EF4-FFF2-40B4-BE49-F238E27FC236}">
+                <a16:creationId xmlns:a16="http://schemas.microsoft.com/office/drawing/2014/main" id="{6D28A385-DC76-6D7F-5D30-55A2627E7E81}"/>
+              </a:ext>
+            </a:extLst>
+          </p:cNvPr>
+          <p:cNvCxnSpPr>
+            <a:cxnSpLocks/>
+          </p:cNvCxnSpPr>
+          <p:nvPr/>
+        </p:nvCxnSpPr>
+        <p:spPr>
+          <a:xfrm>
+            <a:off x="4909940" y="3988609"/>
+            <a:ext cx="387396" cy="383699"/>
+          </a:xfrm>
+          <a:prstGeom prst="straightConnector1">
+            <a:avLst/>
+          </a:prstGeom>
+          <a:ln>
+            <a:solidFill>
+              <a:schemeClr val="tx1"/>
+            </a:solidFill>
+            <a:tailEnd type="triangle"/>
+          </a:ln>
+        </p:spPr>
+        <p:style>
+          <a:lnRef idx="1">
+            <a:schemeClr val="accent1"/>
+          </a:lnRef>
+          <a:fillRef idx="0">
+            <a:schemeClr val="accent1"/>
+          </a:fillRef>
+          <a:effectRef idx="0">
+            <a:schemeClr val="accent1"/>
+          </a:effectRef>
+          <a:fontRef idx="minor">
+            <a:schemeClr val="tx1"/>
+          </a:fontRef>
+        </p:style>
+      </p:cxnSp>
+      <p:sp>
+        <p:nvSpPr>
+          <p:cNvPr id="30" name="TextBox 29">
+            <a:extLst>
+              <a:ext uri="{FF2B5EF4-FFF2-40B4-BE49-F238E27FC236}">
+                <a16:creationId xmlns:a16="http://schemas.microsoft.com/office/drawing/2014/main" id="{B9BAF046-9EC2-26D3-27D9-25C6A2341BD2}"/>
+              </a:ext>
+            </a:extLst>
+          </p:cNvPr>
+          <p:cNvSpPr txBox="1"/>
+          <p:nvPr/>
+        </p:nvSpPr>
+        <p:spPr>
+          <a:xfrm>
+            <a:off x="5010850" y="3988609"/>
+            <a:ext cx="369012" cy="246221"/>
+          </a:xfrm>
+          <a:prstGeom prst="rect">
+            <a:avLst/>
+          </a:prstGeom>
+          <a:noFill/>
+        </p:spPr>
+        <p:txBody>
+          <a:bodyPr wrap="none" rtlCol="0">
+            <a:spAutoFit/>
+          </a:bodyPr>
+          <a:lstStyle/>
+          <a:p>
+            <a:r>
+              <a:rPr lang="en-GB" sz="1000" dirty="0"/>
+              <a:t>YES</a:t>
+            </a:r>
+          </a:p>
+        </p:txBody>
+      </p:sp>
+      <p:sp>
+        <p:nvSpPr>
+          <p:cNvPr id="31" name="TextBox 30">
+            <a:extLst>
+              <a:ext uri="{FF2B5EF4-FFF2-40B4-BE49-F238E27FC236}">
+                <a16:creationId xmlns:a16="http://schemas.microsoft.com/office/drawing/2014/main" id="{5655CAEF-058C-9F31-A24D-76CF56A66213}"/>
+              </a:ext>
+            </a:extLst>
+          </p:cNvPr>
+          <p:cNvSpPr txBox="1"/>
+          <p:nvPr/>
+        </p:nvSpPr>
+        <p:spPr>
+          <a:xfrm>
+            <a:off x="4079607" y="3988609"/>
+            <a:ext cx="352982" cy="246221"/>
+          </a:xfrm>
+          <a:prstGeom prst="rect">
+            <a:avLst/>
+          </a:prstGeom>
+          <a:noFill/>
+        </p:spPr>
+        <p:txBody>
+          <a:bodyPr wrap="none" rtlCol="0">
+            <a:spAutoFit/>
+          </a:bodyPr>
+          <a:lstStyle/>
+          <a:p>
+            <a:r>
+              <a:rPr lang="en-GB" sz="1000" dirty="0"/>
+              <a:t>NO</a:t>
+            </a:r>
+          </a:p>
+        </p:txBody>
+      </p:sp>
+      <p:sp>
+        <p:nvSpPr>
+          <p:cNvPr id="32" name="Oval 31">
+            <a:extLst>
+              <a:ext uri="{FF2B5EF4-FFF2-40B4-BE49-F238E27FC236}">
+                <a16:creationId xmlns:a16="http://schemas.microsoft.com/office/drawing/2014/main" id="{9BC94022-CEA2-D75B-F5F1-5B7BA57212DE}"/>
+              </a:ext>
+            </a:extLst>
+          </p:cNvPr>
+          <p:cNvSpPr/>
+          <p:nvPr/>
+        </p:nvSpPr>
+        <p:spPr>
+          <a:xfrm>
+            <a:off x="3784054" y="3413689"/>
+            <a:ext cx="1345720" cy="520549"/>
+          </a:xfrm>
+          <a:prstGeom prst="ellipse">
+            <a:avLst/>
+          </a:prstGeom>
+          <a:noFill/>
+          <a:ln>
+            <a:solidFill>
+              <a:schemeClr val="tx1"/>
+            </a:solidFill>
+          </a:ln>
+        </p:spPr>
+        <p:style>
+          <a:lnRef idx="2">
+            <a:schemeClr val="accent1">
+              <a:shade val="50000"/>
+            </a:schemeClr>
+          </a:lnRef>
+          <a:fillRef idx="1">
+            <a:schemeClr val="accent1"/>
+          </a:fillRef>
+          <a:effectRef idx="0">
+            <a:schemeClr val="accent1"/>
+          </a:effectRef>
+          <a:fontRef idx="minor">
+            <a:schemeClr val="lt1"/>
+          </a:fontRef>
+        </p:style>
+        <p:txBody>
+          <a:bodyPr rtlCol="0" anchor="ctr"/>
+          <a:lstStyle/>
+          <a:p>
+            <a:pPr algn="ctr"/>
+            <a:r>
+              <a:rPr lang="en-GB" sz="1050" dirty="0">
+                <a:solidFill>
+                  <a:schemeClr val="tx1"/>
+                </a:solidFill>
+              </a:rPr>
+              <a:t>1Y Gov Yield </a:t>
+            </a:r>
+          </a:p>
+          <a:p>
+            <a:pPr algn="ctr"/>
+            <a:r>
+              <a:rPr lang="en-GB" sz="1050" dirty="0">
+                <a:solidFill>
+                  <a:schemeClr val="tx1"/>
+                </a:solidFill>
+              </a:rPr>
+              <a:t>&lt; 0.54</a:t>
+            </a:r>
+          </a:p>
+        </p:txBody>
+      </p:sp>
+      <p:pic>
+        <p:nvPicPr>
+          <p:cNvPr id="35" name="Graphic 34" descr="Leaf outline">
+            <a:extLst>
+              <a:ext uri="{FF2B5EF4-FFF2-40B4-BE49-F238E27FC236}">
+                <a16:creationId xmlns:a16="http://schemas.microsoft.com/office/drawing/2014/main" id="{5DBC056B-0558-A360-C7D8-D77065177FE8}"/>
+              </a:ext>
+            </a:extLst>
+          </p:cNvPr>
+          <p:cNvPicPr>
+            <a:picLocks noChangeAspect="1"/>
+          </p:cNvPicPr>
+          <p:nvPr/>
+        </p:nvPicPr>
+        <p:blipFill>
+          <a:blip r:embed="rId2">
+            <a:extLst>
+              <a:ext uri="{28A0092B-C50C-407E-A947-70E740481C1C}">
+                <a14:useLocalDpi xmlns:a14="http://schemas.microsoft.com/office/drawing/2010/main" val="0"/>
+              </a:ext>
+              <a:ext uri="{96DAC541-7B7A-43D3-8B79-37D633B846F1}">
+                <asvg:svgBlip xmlns:asvg="http://schemas.microsoft.com/office/drawing/2016/SVG/main" r:embed="rId3"/>
+              </a:ext>
+            </a:extLst>
+          </a:blip>
+          <a:stretch>
+            <a:fillRect/>
+          </a:stretch>
+        </p:blipFill>
+        <p:spPr>
+          <a:xfrm>
+            <a:off x="5041275" y="4300246"/>
+            <a:ext cx="677174" cy="677174"/>
+          </a:xfrm>
+          <a:prstGeom prst="rect">
+            <a:avLst/>
+          </a:prstGeom>
+        </p:spPr>
+      </p:pic>
+      <p:sp>
+        <p:nvSpPr>
+          <p:cNvPr id="36" name="TextBox 35">
+            <a:extLst>
+              <a:ext uri="{FF2B5EF4-FFF2-40B4-BE49-F238E27FC236}">
+                <a16:creationId xmlns:a16="http://schemas.microsoft.com/office/drawing/2014/main" id="{A0E11403-78D9-9FDF-4968-6F137DE68F09}"/>
+              </a:ext>
+            </a:extLst>
+          </p:cNvPr>
+          <p:cNvSpPr txBox="1"/>
+          <p:nvPr/>
+        </p:nvSpPr>
+        <p:spPr>
+          <a:xfrm>
+            <a:off x="5157401" y="4392612"/>
+            <a:ext cx="545342" cy="246221"/>
+          </a:xfrm>
+          <a:prstGeom prst="rect">
+            <a:avLst/>
+          </a:prstGeom>
+          <a:noFill/>
+        </p:spPr>
+        <p:txBody>
+          <a:bodyPr wrap="none" rtlCol="0">
+            <a:spAutoFit/>
+          </a:bodyPr>
+          <a:lstStyle/>
+          <a:p>
+            <a:r>
+              <a:rPr lang="en-GB" sz="1000" dirty="0"/>
+              <a:t>0.2017</a:t>
+            </a:r>
+          </a:p>
+        </p:txBody>
+      </p:sp>
+      <p:pic>
+        <p:nvPicPr>
+          <p:cNvPr id="37" name="Graphic 36" descr="Leaf outline">
+            <a:extLst>
+              <a:ext uri="{FF2B5EF4-FFF2-40B4-BE49-F238E27FC236}">
+                <a16:creationId xmlns:a16="http://schemas.microsoft.com/office/drawing/2014/main" id="{0018C4C5-E00B-CFCE-DB5A-18B6063C767C}"/>
+              </a:ext>
+            </a:extLst>
+          </p:cNvPr>
+          <p:cNvPicPr>
+            <a:picLocks noChangeAspect="1"/>
+          </p:cNvPicPr>
+          <p:nvPr/>
+        </p:nvPicPr>
+        <p:blipFill>
+          <a:blip r:embed="rId2">
+            <a:extLst>
+              <a:ext uri="{28A0092B-C50C-407E-A947-70E740481C1C}">
+                <a14:useLocalDpi xmlns:a14="http://schemas.microsoft.com/office/drawing/2010/main" val="0"/>
+              </a:ext>
+              <a:ext uri="{96DAC541-7B7A-43D3-8B79-37D633B846F1}">
+                <asvg:svgBlip xmlns:asvg="http://schemas.microsoft.com/office/drawing/2016/SVG/main" r:embed="rId3"/>
+              </a:ext>
+            </a:extLst>
+          </a:blip>
+          <a:stretch>
+            <a:fillRect/>
+          </a:stretch>
+        </p:blipFill>
+        <p:spPr>
+          <a:xfrm>
+            <a:off x="3755415" y="4289201"/>
+            <a:ext cx="677174" cy="677174"/>
+          </a:xfrm>
+          <a:prstGeom prst="rect">
+            <a:avLst/>
+          </a:prstGeom>
+        </p:spPr>
+      </p:pic>
+      <p:sp>
+        <p:nvSpPr>
+          <p:cNvPr id="38" name="TextBox 37">
+            <a:extLst>
+              <a:ext uri="{FF2B5EF4-FFF2-40B4-BE49-F238E27FC236}">
+                <a16:creationId xmlns:a16="http://schemas.microsoft.com/office/drawing/2014/main" id="{92825787-3133-5DCD-B06B-4FC4CF12B104}"/>
+              </a:ext>
+            </a:extLst>
+          </p:cNvPr>
+          <p:cNvSpPr txBox="1"/>
+          <p:nvPr/>
+        </p:nvSpPr>
+        <p:spPr>
+          <a:xfrm>
+            <a:off x="3871541" y="4381567"/>
+            <a:ext cx="545342" cy="246221"/>
+          </a:xfrm>
+          <a:prstGeom prst="rect">
+            <a:avLst/>
+          </a:prstGeom>
+          <a:noFill/>
+        </p:spPr>
+        <p:txBody>
+          <a:bodyPr wrap="none" rtlCol="0">
+            <a:spAutoFit/>
+          </a:bodyPr>
+          <a:lstStyle/>
+          <a:p>
+            <a:r>
+              <a:rPr lang="en-GB" sz="1000" dirty="0"/>
+              <a:t>0.0045</a:t>
+            </a:r>
+          </a:p>
+        </p:txBody>
+      </p:sp>
+      <p:sp>
+        <p:nvSpPr>
+          <p:cNvPr id="39" name="Oval 38">
+            <a:extLst>
+              <a:ext uri="{FF2B5EF4-FFF2-40B4-BE49-F238E27FC236}">
+                <a16:creationId xmlns:a16="http://schemas.microsoft.com/office/drawing/2014/main" id="{9B6A4700-92F2-43AD-3639-B608682F94D2}"/>
+              </a:ext>
+            </a:extLst>
+          </p:cNvPr>
+          <p:cNvSpPr/>
+          <p:nvPr/>
+        </p:nvSpPr>
+        <p:spPr>
+          <a:xfrm>
+            <a:off x="2156290" y="3392038"/>
+            <a:ext cx="1345720" cy="520549"/>
+          </a:xfrm>
+          <a:prstGeom prst="ellipse">
+            <a:avLst/>
+          </a:prstGeom>
+          <a:noFill/>
+          <a:ln>
+            <a:solidFill>
+              <a:schemeClr val="tx1"/>
+            </a:solidFill>
+          </a:ln>
+        </p:spPr>
+        <p:style>
+          <a:lnRef idx="2">
+            <a:schemeClr val="accent1">
+              <a:shade val="50000"/>
+            </a:schemeClr>
+          </a:lnRef>
+          <a:fillRef idx="1">
+            <a:schemeClr val="accent1"/>
+          </a:fillRef>
+          <a:effectRef idx="0">
+            <a:schemeClr val="accent1"/>
+          </a:effectRef>
+          <a:fontRef idx="minor">
+            <a:schemeClr val="lt1"/>
+          </a:fontRef>
+        </p:style>
+        <p:txBody>
+          <a:bodyPr rtlCol="0" anchor="ctr"/>
+          <a:lstStyle/>
+          <a:p>
+            <a:pPr algn="ctr"/>
+            <a:r>
+              <a:rPr lang="en-GB" sz="1050" dirty="0">
+                <a:solidFill>
+                  <a:schemeClr val="tx1"/>
+                </a:solidFill>
+              </a:rPr>
+              <a:t>FTSE 100 </a:t>
+            </a:r>
+            <a:r>
+              <a:rPr lang="en-GB" sz="1050" dirty="0" err="1">
+                <a:solidFill>
+                  <a:schemeClr val="tx1"/>
+                </a:solidFill>
+              </a:rPr>
+              <a:t>StDev</a:t>
+            </a:r>
+            <a:endParaRPr lang="en-GB" sz="1050" dirty="0">
+              <a:solidFill>
+                <a:schemeClr val="tx1"/>
+              </a:solidFill>
+            </a:endParaRPr>
+          </a:p>
+          <a:p>
+            <a:pPr algn="ctr"/>
+            <a:r>
+              <a:rPr lang="en-GB" sz="1050" dirty="0">
+                <a:solidFill>
+                  <a:schemeClr val="tx1"/>
+                </a:solidFill>
+              </a:rPr>
+              <a:t>&lt; 0.528</a:t>
+            </a:r>
+          </a:p>
+        </p:txBody>
+      </p:sp>
+      <p:cxnSp>
+        <p:nvCxnSpPr>
+          <p:cNvPr id="41" name="Straight Arrow Connector 40">
+            <a:extLst>
+              <a:ext uri="{FF2B5EF4-FFF2-40B4-BE49-F238E27FC236}">
+                <a16:creationId xmlns:a16="http://schemas.microsoft.com/office/drawing/2014/main" id="{BD2D2E6A-A888-6877-6B2C-DFCF84DD40DA}"/>
+              </a:ext>
+            </a:extLst>
+          </p:cNvPr>
+          <p:cNvCxnSpPr>
+            <a:cxnSpLocks/>
+          </p:cNvCxnSpPr>
+          <p:nvPr/>
+        </p:nvCxnSpPr>
+        <p:spPr>
+          <a:xfrm flipH="1">
+            <a:off x="2339053" y="3972181"/>
+            <a:ext cx="294090" cy="383699"/>
+          </a:xfrm>
+          <a:prstGeom prst="straightConnector1">
+            <a:avLst/>
+          </a:prstGeom>
+          <a:ln>
+            <a:solidFill>
+              <a:schemeClr val="tx1"/>
+            </a:solidFill>
+            <a:tailEnd type="triangle"/>
+          </a:ln>
+        </p:spPr>
+        <p:style>
+          <a:lnRef idx="1">
+            <a:schemeClr val="accent1"/>
+          </a:lnRef>
+          <a:fillRef idx="0">
+            <a:schemeClr val="accent1"/>
+          </a:fillRef>
+          <a:effectRef idx="0">
+            <a:schemeClr val="accent1"/>
+          </a:effectRef>
+          <a:fontRef idx="minor">
+            <a:schemeClr val="tx1"/>
+          </a:fontRef>
+        </p:style>
+      </p:cxnSp>
+      <p:cxnSp>
+        <p:nvCxnSpPr>
+          <p:cNvPr id="42" name="Straight Arrow Connector 41">
+            <a:extLst>
+              <a:ext uri="{FF2B5EF4-FFF2-40B4-BE49-F238E27FC236}">
+                <a16:creationId xmlns:a16="http://schemas.microsoft.com/office/drawing/2014/main" id="{A2E10AEB-5399-5CFB-D187-8A9F90B0180B}"/>
+              </a:ext>
+            </a:extLst>
+          </p:cNvPr>
+          <p:cNvCxnSpPr>
+            <a:cxnSpLocks/>
+          </p:cNvCxnSpPr>
+          <p:nvPr/>
+        </p:nvCxnSpPr>
+        <p:spPr>
+          <a:xfrm>
+            <a:off x="2923997" y="3982288"/>
+            <a:ext cx="387396" cy="383699"/>
+          </a:xfrm>
+          <a:prstGeom prst="straightConnector1">
+            <a:avLst/>
+          </a:prstGeom>
+          <a:ln>
+            <a:solidFill>
+              <a:schemeClr val="tx1"/>
+            </a:solidFill>
+            <a:tailEnd type="triangle"/>
+          </a:ln>
+        </p:spPr>
+        <p:style>
+          <a:lnRef idx="1">
+            <a:schemeClr val="accent1"/>
+          </a:lnRef>
+          <a:fillRef idx="0">
+            <a:schemeClr val="accent1"/>
+          </a:fillRef>
+          <a:effectRef idx="0">
+            <a:schemeClr val="accent1"/>
+          </a:effectRef>
+          <a:fontRef idx="minor">
+            <a:schemeClr val="tx1"/>
+          </a:fontRef>
+        </p:style>
+      </p:cxnSp>
+      <p:sp>
+        <p:nvSpPr>
+          <p:cNvPr id="43" name="TextBox 42">
+            <a:extLst>
+              <a:ext uri="{FF2B5EF4-FFF2-40B4-BE49-F238E27FC236}">
+                <a16:creationId xmlns:a16="http://schemas.microsoft.com/office/drawing/2014/main" id="{07447074-E802-1E32-6062-AC1B6F6E9C74}"/>
+              </a:ext>
+            </a:extLst>
+          </p:cNvPr>
+          <p:cNvSpPr txBox="1"/>
+          <p:nvPr/>
+        </p:nvSpPr>
+        <p:spPr>
+          <a:xfrm>
+            <a:off x="3024907" y="3982288"/>
+            <a:ext cx="369012" cy="246221"/>
+          </a:xfrm>
+          <a:prstGeom prst="rect">
+            <a:avLst/>
+          </a:prstGeom>
+          <a:noFill/>
+        </p:spPr>
+        <p:txBody>
+          <a:bodyPr wrap="none" rtlCol="0">
+            <a:spAutoFit/>
+          </a:bodyPr>
+          <a:lstStyle/>
+          <a:p>
+            <a:r>
+              <a:rPr lang="en-GB" sz="1000" dirty="0"/>
+              <a:t>YES</a:t>
+            </a:r>
+          </a:p>
+        </p:txBody>
+      </p:sp>
+      <p:sp>
+        <p:nvSpPr>
+          <p:cNvPr id="44" name="TextBox 43">
+            <a:extLst>
+              <a:ext uri="{FF2B5EF4-FFF2-40B4-BE49-F238E27FC236}">
+                <a16:creationId xmlns:a16="http://schemas.microsoft.com/office/drawing/2014/main" id="{B301C79C-DA38-5BE7-0A26-C0F331F8BBD1}"/>
+              </a:ext>
+            </a:extLst>
+          </p:cNvPr>
+          <p:cNvSpPr txBox="1"/>
+          <p:nvPr/>
+        </p:nvSpPr>
+        <p:spPr>
+          <a:xfrm>
+            <a:off x="2206304" y="3989433"/>
+            <a:ext cx="352982" cy="246221"/>
+          </a:xfrm>
+          <a:prstGeom prst="rect">
+            <a:avLst/>
+          </a:prstGeom>
+          <a:noFill/>
+        </p:spPr>
+        <p:txBody>
+          <a:bodyPr wrap="none" rtlCol="0">
+            <a:spAutoFit/>
+          </a:bodyPr>
+          <a:lstStyle/>
+          <a:p>
+            <a:r>
+              <a:rPr lang="en-GB" sz="1000" dirty="0"/>
+              <a:t>NO</a:t>
+            </a:r>
+          </a:p>
+        </p:txBody>
+      </p:sp>
+      <p:pic>
+        <p:nvPicPr>
+          <p:cNvPr id="45" name="Graphic 44" descr="Leaf outline">
+            <a:extLst>
+              <a:ext uri="{FF2B5EF4-FFF2-40B4-BE49-F238E27FC236}">
+                <a16:creationId xmlns:a16="http://schemas.microsoft.com/office/drawing/2014/main" id="{5AA43708-314C-5BFD-275B-8B1FFBF78176}"/>
+              </a:ext>
+            </a:extLst>
+          </p:cNvPr>
+          <p:cNvPicPr>
+            <a:picLocks noChangeAspect="1"/>
+          </p:cNvPicPr>
+          <p:nvPr/>
+        </p:nvPicPr>
+        <p:blipFill>
+          <a:blip r:embed="rId2">
+            <a:extLst>
+              <a:ext uri="{28A0092B-C50C-407E-A947-70E740481C1C}">
+                <a14:useLocalDpi xmlns:a14="http://schemas.microsoft.com/office/drawing/2010/main" val="0"/>
+              </a:ext>
+              <a:ext uri="{96DAC541-7B7A-43D3-8B79-37D633B846F1}">
+                <asvg:svgBlip xmlns:asvg="http://schemas.microsoft.com/office/drawing/2016/SVG/main" r:embed="rId3"/>
+              </a:ext>
+            </a:extLst>
+          </a:blip>
+          <a:stretch>
+            <a:fillRect/>
+          </a:stretch>
+        </p:blipFill>
+        <p:spPr>
+          <a:xfrm>
+            <a:off x="3016378" y="4297667"/>
+            <a:ext cx="677174" cy="677174"/>
+          </a:xfrm>
+          <a:prstGeom prst="rect">
+            <a:avLst/>
+          </a:prstGeom>
+        </p:spPr>
+      </p:pic>
+      <p:sp>
+        <p:nvSpPr>
+          <p:cNvPr id="46" name="TextBox 45">
+            <a:extLst>
+              <a:ext uri="{FF2B5EF4-FFF2-40B4-BE49-F238E27FC236}">
+                <a16:creationId xmlns:a16="http://schemas.microsoft.com/office/drawing/2014/main" id="{585B2997-ACE4-80AF-EE5C-8E0B5FEFBCC3}"/>
+              </a:ext>
+            </a:extLst>
+          </p:cNvPr>
+          <p:cNvSpPr txBox="1"/>
+          <p:nvPr/>
+        </p:nvSpPr>
+        <p:spPr>
+          <a:xfrm>
+            <a:off x="3115252" y="4390033"/>
+            <a:ext cx="583814" cy="246221"/>
+          </a:xfrm>
+          <a:prstGeom prst="rect">
+            <a:avLst/>
+          </a:prstGeom>
+          <a:noFill/>
+        </p:spPr>
+        <p:txBody>
+          <a:bodyPr wrap="none" rtlCol="0">
+            <a:spAutoFit/>
+          </a:bodyPr>
+          <a:lstStyle/>
+          <a:p>
+            <a:r>
+              <a:rPr lang="en-GB" sz="1000" dirty="0"/>
+              <a:t>-0.0107</a:t>
+            </a:r>
+          </a:p>
+        </p:txBody>
+      </p:sp>
+      <p:sp>
+        <p:nvSpPr>
+          <p:cNvPr id="48" name="Oval 47">
+            <a:extLst>
+              <a:ext uri="{FF2B5EF4-FFF2-40B4-BE49-F238E27FC236}">
+                <a16:creationId xmlns:a16="http://schemas.microsoft.com/office/drawing/2014/main" id="{8D8B6095-5446-D6BF-FBD6-506944537BD7}"/>
+              </a:ext>
+            </a:extLst>
+          </p:cNvPr>
+          <p:cNvSpPr/>
+          <p:nvPr/>
+        </p:nvSpPr>
+        <p:spPr>
+          <a:xfrm>
+            <a:off x="1465189" y="4415474"/>
+            <a:ext cx="1345720" cy="520549"/>
+          </a:xfrm>
+          <a:prstGeom prst="ellipse">
+            <a:avLst/>
+          </a:prstGeom>
+          <a:noFill/>
+          <a:ln>
+            <a:solidFill>
+              <a:schemeClr val="tx1"/>
+            </a:solidFill>
+          </a:ln>
+        </p:spPr>
+        <p:style>
+          <a:lnRef idx="2">
+            <a:schemeClr val="accent1">
+              <a:shade val="50000"/>
+            </a:schemeClr>
+          </a:lnRef>
+          <a:fillRef idx="1">
+            <a:schemeClr val="accent1"/>
+          </a:fillRef>
+          <a:effectRef idx="0">
+            <a:schemeClr val="accent1"/>
+          </a:effectRef>
+          <a:fontRef idx="minor">
+            <a:schemeClr val="lt1"/>
+          </a:fontRef>
+        </p:style>
+        <p:txBody>
+          <a:bodyPr rtlCol="0" anchor="ctr"/>
+          <a:lstStyle/>
+          <a:p>
+            <a:pPr algn="ctr"/>
+            <a:r>
+              <a:rPr lang="en-GB" sz="1050" dirty="0">
+                <a:solidFill>
+                  <a:schemeClr val="tx1"/>
+                </a:solidFill>
+              </a:rPr>
+              <a:t>1Y Gov Yield </a:t>
+            </a:r>
+          </a:p>
+          <a:p>
+            <a:pPr algn="ctr"/>
+            <a:r>
+              <a:rPr lang="en-GB" sz="1050" dirty="0">
+                <a:solidFill>
+                  <a:schemeClr val="tx1"/>
+                </a:solidFill>
+              </a:rPr>
+              <a:t>&lt; 0.53</a:t>
+            </a:r>
+          </a:p>
+        </p:txBody>
+      </p:sp>
+      <p:cxnSp>
+        <p:nvCxnSpPr>
+          <p:cNvPr id="49" name="Straight Arrow Connector 48">
+            <a:extLst>
+              <a:ext uri="{FF2B5EF4-FFF2-40B4-BE49-F238E27FC236}">
+                <a16:creationId xmlns:a16="http://schemas.microsoft.com/office/drawing/2014/main" id="{F43191C6-8EA6-FAD7-003C-C88712BCB796}"/>
+              </a:ext>
+            </a:extLst>
+          </p:cNvPr>
+          <p:cNvCxnSpPr>
+            <a:cxnSpLocks/>
+          </p:cNvCxnSpPr>
+          <p:nvPr/>
+        </p:nvCxnSpPr>
+        <p:spPr>
+          <a:xfrm flipH="1">
+            <a:off x="1738880" y="4948090"/>
+            <a:ext cx="294090" cy="383699"/>
+          </a:xfrm>
+          <a:prstGeom prst="straightConnector1">
+            <a:avLst/>
+          </a:prstGeom>
+          <a:ln>
+            <a:solidFill>
+              <a:schemeClr val="tx1"/>
+            </a:solidFill>
+            <a:tailEnd type="triangle"/>
+          </a:ln>
+        </p:spPr>
+        <p:style>
+          <a:lnRef idx="1">
+            <a:schemeClr val="accent1"/>
+          </a:lnRef>
+          <a:fillRef idx="0">
+            <a:schemeClr val="accent1"/>
+          </a:fillRef>
+          <a:effectRef idx="0">
+            <a:schemeClr val="accent1"/>
+          </a:effectRef>
+          <a:fontRef idx="minor">
+            <a:schemeClr val="tx1"/>
+          </a:fontRef>
+        </p:style>
+      </p:cxnSp>
+      <p:cxnSp>
+        <p:nvCxnSpPr>
+          <p:cNvPr id="50" name="Straight Arrow Connector 49">
+            <a:extLst>
+              <a:ext uri="{FF2B5EF4-FFF2-40B4-BE49-F238E27FC236}">
+                <a16:creationId xmlns:a16="http://schemas.microsoft.com/office/drawing/2014/main" id="{8114DDE5-4AEE-BFD2-C826-2CA13D9259B2}"/>
+              </a:ext>
+            </a:extLst>
+          </p:cNvPr>
+          <p:cNvCxnSpPr>
+            <a:cxnSpLocks/>
+          </p:cNvCxnSpPr>
+          <p:nvPr/>
+        </p:nvCxnSpPr>
+        <p:spPr>
+          <a:xfrm>
+            <a:off x="2323824" y="4958197"/>
+            <a:ext cx="387396" cy="383699"/>
+          </a:xfrm>
+          <a:prstGeom prst="straightConnector1">
+            <a:avLst/>
+          </a:prstGeom>
+          <a:ln>
+            <a:solidFill>
+              <a:schemeClr val="tx1"/>
+            </a:solidFill>
+            <a:tailEnd type="triangle"/>
+          </a:ln>
+        </p:spPr>
+        <p:style>
+          <a:lnRef idx="1">
+            <a:schemeClr val="accent1"/>
+          </a:lnRef>
+          <a:fillRef idx="0">
+            <a:schemeClr val="accent1"/>
+          </a:fillRef>
+          <a:effectRef idx="0">
+            <a:schemeClr val="accent1"/>
+          </a:effectRef>
+          <a:fontRef idx="minor">
+            <a:schemeClr val="tx1"/>
+          </a:fontRef>
+        </p:style>
+      </p:cxnSp>
+      <p:sp>
+        <p:nvSpPr>
+          <p:cNvPr id="51" name="TextBox 50">
+            <a:extLst>
+              <a:ext uri="{FF2B5EF4-FFF2-40B4-BE49-F238E27FC236}">
+                <a16:creationId xmlns:a16="http://schemas.microsoft.com/office/drawing/2014/main" id="{E2BF5DA0-1F23-0067-33E9-F6BB21D8D34B}"/>
+              </a:ext>
+            </a:extLst>
+          </p:cNvPr>
+          <p:cNvSpPr txBox="1"/>
+          <p:nvPr/>
+        </p:nvSpPr>
+        <p:spPr>
+          <a:xfrm>
+            <a:off x="2424734" y="4958197"/>
+            <a:ext cx="369012" cy="246221"/>
+          </a:xfrm>
+          <a:prstGeom prst="rect">
+            <a:avLst/>
+          </a:prstGeom>
+          <a:noFill/>
+        </p:spPr>
+        <p:txBody>
+          <a:bodyPr wrap="none" rtlCol="0">
+            <a:spAutoFit/>
+          </a:bodyPr>
+          <a:lstStyle/>
+          <a:p>
+            <a:r>
+              <a:rPr lang="en-GB" sz="1000" dirty="0"/>
+              <a:t>YES</a:t>
+            </a:r>
+          </a:p>
+        </p:txBody>
+      </p:sp>
+      <p:sp>
+        <p:nvSpPr>
+          <p:cNvPr id="52" name="TextBox 51">
+            <a:extLst>
+              <a:ext uri="{FF2B5EF4-FFF2-40B4-BE49-F238E27FC236}">
+                <a16:creationId xmlns:a16="http://schemas.microsoft.com/office/drawing/2014/main" id="{06C58C84-9B64-DFD5-3243-99369814399C}"/>
+              </a:ext>
+            </a:extLst>
+          </p:cNvPr>
+          <p:cNvSpPr txBox="1"/>
+          <p:nvPr/>
+        </p:nvSpPr>
+        <p:spPr>
+          <a:xfrm>
+            <a:off x="1606131" y="4965342"/>
+            <a:ext cx="352982" cy="246221"/>
+          </a:xfrm>
+          <a:prstGeom prst="rect">
+            <a:avLst/>
+          </a:prstGeom>
+          <a:noFill/>
+        </p:spPr>
+        <p:txBody>
+          <a:bodyPr wrap="none" rtlCol="0">
+            <a:spAutoFit/>
+          </a:bodyPr>
+          <a:lstStyle/>
+          <a:p>
+            <a:r>
+              <a:rPr lang="en-GB" sz="1000" dirty="0"/>
+              <a:t>NO</a:t>
+            </a:r>
+          </a:p>
+        </p:txBody>
+      </p:sp>
+      <p:sp>
+        <p:nvSpPr>
+          <p:cNvPr id="54" name="Oval 53">
+            <a:extLst>
+              <a:ext uri="{FF2B5EF4-FFF2-40B4-BE49-F238E27FC236}">
+                <a16:creationId xmlns:a16="http://schemas.microsoft.com/office/drawing/2014/main" id="{C2BEBCE8-2BF8-FAAC-581F-92C33DB87FA1}"/>
+              </a:ext>
+            </a:extLst>
+          </p:cNvPr>
+          <p:cNvSpPr/>
+          <p:nvPr/>
+        </p:nvSpPr>
+        <p:spPr>
+          <a:xfrm>
+            <a:off x="2463670" y="5353386"/>
+            <a:ext cx="1345720" cy="520549"/>
+          </a:xfrm>
+          <a:prstGeom prst="ellipse">
+            <a:avLst/>
+          </a:prstGeom>
+          <a:noFill/>
+          <a:ln>
+            <a:solidFill>
+              <a:schemeClr val="tx1"/>
+            </a:solidFill>
+          </a:ln>
+        </p:spPr>
+        <p:style>
+          <a:lnRef idx="2">
+            <a:schemeClr val="accent1">
+              <a:shade val="50000"/>
+            </a:schemeClr>
+          </a:lnRef>
+          <a:fillRef idx="1">
+            <a:schemeClr val="accent1"/>
+          </a:fillRef>
+          <a:effectRef idx="0">
+            <a:schemeClr val="accent1"/>
+          </a:effectRef>
+          <a:fontRef idx="minor">
+            <a:schemeClr val="lt1"/>
+          </a:fontRef>
+        </p:style>
+        <p:txBody>
+          <a:bodyPr rtlCol="0" anchor="ctr"/>
+          <a:lstStyle/>
+          <a:p>
+            <a:pPr algn="ctr"/>
+            <a:r>
+              <a:rPr lang="en-GB" sz="1050" dirty="0">
+                <a:solidFill>
+                  <a:schemeClr val="tx1"/>
+                </a:solidFill>
+              </a:rPr>
+              <a:t>1Y Gov Yield </a:t>
+            </a:r>
+          </a:p>
+          <a:p>
+            <a:pPr algn="ctr"/>
+            <a:r>
+              <a:rPr lang="en-GB" sz="1050" dirty="0">
+                <a:solidFill>
+                  <a:schemeClr val="tx1"/>
+                </a:solidFill>
+              </a:rPr>
+              <a:t>&lt; 0.36</a:t>
+            </a:r>
+          </a:p>
+        </p:txBody>
+      </p:sp>
+      <p:cxnSp>
+        <p:nvCxnSpPr>
+          <p:cNvPr id="55" name="Straight Arrow Connector 54">
+            <a:extLst>
+              <a:ext uri="{FF2B5EF4-FFF2-40B4-BE49-F238E27FC236}">
+                <a16:creationId xmlns:a16="http://schemas.microsoft.com/office/drawing/2014/main" id="{A62771C1-7F12-DE46-03AD-C578E81EDD3B}"/>
+              </a:ext>
+            </a:extLst>
+          </p:cNvPr>
+          <p:cNvCxnSpPr>
+            <a:cxnSpLocks/>
+          </p:cNvCxnSpPr>
+          <p:nvPr/>
+        </p:nvCxnSpPr>
+        <p:spPr>
+          <a:xfrm flipH="1">
+            <a:off x="2613095" y="5873973"/>
+            <a:ext cx="294090" cy="383699"/>
+          </a:xfrm>
+          <a:prstGeom prst="straightConnector1">
+            <a:avLst/>
+          </a:prstGeom>
+          <a:ln>
+            <a:solidFill>
+              <a:schemeClr val="tx1"/>
+            </a:solidFill>
+            <a:tailEnd type="triangle"/>
+          </a:ln>
+        </p:spPr>
+        <p:style>
+          <a:lnRef idx="1">
+            <a:schemeClr val="accent1"/>
+          </a:lnRef>
+          <a:fillRef idx="0">
+            <a:schemeClr val="accent1"/>
+          </a:fillRef>
+          <a:effectRef idx="0">
+            <a:schemeClr val="accent1"/>
+          </a:effectRef>
+          <a:fontRef idx="minor">
+            <a:schemeClr val="tx1"/>
+          </a:fontRef>
+        </p:style>
+      </p:cxnSp>
+      <p:cxnSp>
+        <p:nvCxnSpPr>
+          <p:cNvPr id="56" name="Straight Arrow Connector 55">
+            <a:extLst>
+              <a:ext uri="{FF2B5EF4-FFF2-40B4-BE49-F238E27FC236}">
+                <a16:creationId xmlns:a16="http://schemas.microsoft.com/office/drawing/2014/main" id="{4B317C15-C79D-D539-A1ED-BB9F338985DC}"/>
+              </a:ext>
+            </a:extLst>
+          </p:cNvPr>
+          <p:cNvCxnSpPr>
+            <a:cxnSpLocks/>
+          </p:cNvCxnSpPr>
+          <p:nvPr/>
+        </p:nvCxnSpPr>
+        <p:spPr>
+          <a:xfrm>
+            <a:off x="3310679" y="5891225"/>
+            <a:ext cx="387396" cy="383699"/>
+          </a:xfrm>
+          <a:prstGeom prst="straightConnector1">
+            <a:avLst/>
+          </a:prstGeom>
+          <a:ln>
+            <a:solidFill>
+              <a:schemeClr val="tx1"/>
+            </a:solidFill>
+            <a:tailEnd type="triangle"/>
+          </a:ln>
+        </p:spPr>
+        <p:style>
+          <a:lnRef idx="1">
+            <a:schemeClr val="accent1"/>
+          </a:lnRef>
+          <a:fillRef idx="0">
+            <a:schemeClr val="accent1"/>
+          </a:fillRef>
+          <a:effectRef idx="0">
+            <a:schemeClr val="accent1"/>
+          </a:effectRef>
+          <a:fontRef idx="minor">
+            <a:schemeClr val="tx1"/>
+          </a:fontRef>
+        </p:style>
+      </p:cxnSp>
+      <p:sp>
+        <p:nvSpPr>
+          <p:cNvPr id="57" name="TextBox 56">
+            <a:extLst>
+              <a:ext uri="{FF2B5EF4-FFF2-40B4-BE49-F238E27FC236}">
+                <a16:creationId xmlns:a16="http://schemas.microsoft.com/office/drawing/2014/main" id="{8D817D29-99F9-A2C0-8573-89981DD082BD}"/>
+              </a:ext>
+            </a:extLst>
+          </p:cNvPr>
+          <p:cNvSpPr txBox="1"/>
+          <p:nvPr/>
+        </p:nvSpPr>
+        <p:spPr>
+          <a:xfrm>
+            <a:off x="3411589" y="5891225"/>
+            <a:ext cx="369012" cy="246221"/>
+          </a:xfrm>
+          <a:prstGeom prst="rect">
+            <a:avLst/>
+          </a:prstGeom>
+          <a:noFill/>
+        </p:spPr>
+        <p:txBody>
+          <a:bodyPr wrap="none" rtlCol="0">
+            <a:spAutoFit/>
+          </a:bodyPr>
+          <a:lstStyle/>
+          <a:p>
+            <a:r>
+              <a:rPr lang="en-GB" sz="1000" dirty="0"/>
+              <a:t>YES</a:t>
+            </a:r>
+          </a:p>
+        </p:txBody>
+      </p:sp>
+      <p:sp>
+        <p:nvSpPr>
+          <p:cNvPr id="58" name="TextBox 57">
+            <a:extLst>
+              <a:ext uri="{FF2B5EF4-FFF2-40B4-BE49-F238E27FC236}">
+                <a16:creationId xmlns:a16="http://schemas.microsoft.com/office/drawing/2014/main" id="{4AB0174A-CCAC-42F7-660B-5CBA4B780773}"/>
+              </a:ext>
+            </a:extLst>
+          </p:cNvPr>
+          <p:cNvSpPr txBox="1"/>
+          <p:nvPr/>
+        </p:nvSpPr>
+        <p:spPr>
+          <a:xfrm>
+            <a:off x="2480346" y="5891225"/>
+            <a:ext cx="352982" cy="246221"/>
+          </a:xfrm>
+          <a:prstGeom prst="rect">
+            <a:avLst/>
+          </a:prstGeom>
+          <a:noFill/>
+        </p:spPr>
+        <p:txBody>
+          <a:bodyPr wrap="none" rtlCol="0">
+            <a:spAutoFit/>
+          </a:bodyPr>
+          <a:lstStyle/>
+          <a:p>
+            <a:r>
+              <a:rPr lang="en-GB" sz="1000" dirty="0"/>
+              <a:t>NO</a:t>
+            </a:r>
+          </a:p>
+        </p:txBody>
+      </p:sp>
+      <p:pic>
+        <p:nvPicPr>
+          <p:cNvPr id="59" name="Graphic 58" descr="Leaf outline">
+            <a:extLst>
+              <a:ext uri="{FF2B5EF4-FFF2-40B4-BE49-F238E27FC236}">
+                <a16:creationId xmlns:a16="http://schemas.microsoft.com/office/drawing/2014/main" id="{363FAAC8-7EFB-C14E-F08D-69DB2586D547}"/>
+              </a:ext>
+            </a:extLst>
+          </p:cNvPr>
+          <p:cNvPicPr>
+            <a:picLocks noChangeAspect="1"/>
+          </p:cNvPicPr>
+          <p:nvPr/>
+        </p:nvPicPr>
+        <p:blipFill>
+          <a:blip r:embed="rId2">
+            <a:extLst>
+              <a:ext uri="{28A0092B-C50C-407E-A947-70E740481C1C}">
+                <a14:useLocalDpi xmlns:a14="http://schemas.microsoft.com/office/drawing/2010/main" val="0"/>
+              </a:ext>
+              <a:ext uri="{96DAC541-7B7A-43D3-8B79-37D633B846F1}">
+                <asvg:svgBlip xmlns:asvg="http://schemas.microsoft.com/office/drawing/2016/SVG/main" r:embed="rId3"/>
+              </a:ext>
+            </a:extLst>
+          </a:blip>
+          <a:stretch>
+            <a:fillRect/>
+          </a:stretch>
+        </p:blipFill>
+        <p:spPr>
+          <a:xfrm>
+            <a:off x="3442014" y="6202862"/>
+            <a:ext cx="677174" cy="677174"/>
+          </a:xfrm>
+          <a:prstGeom prst="rect">
+            <a:avLst/>
+          </a:prstGeom>
+        </p:spPr>
+      </p:pic>
+      <p:sp>
+        <p:nvSpPr>
+          <p:cNvPr id="60" name="TextBox 59">
+            <a:extLst>
+              <a:ext uri="{FF2B5EF4-FFF2-40B4-BE49-F238E27FC236}">
+                <a16:creationId xmlns:a16="http://schemas.microsoft.com/office/drawing/2014/main" id="{F1139FED-663B-2901-D1BE-32AA6AF6E39D}"/>
+              </a:ext>
+            </a:extLst>
+          </p:cNvPr>
+          <p:cNvSpPr txBox="1"/>
+          <p:nvPr/>
+        </p:nvSpPr>
+        <p:spPr>
+          <a:xfrm>
+            <a:off x="3558140" y="6295228"/>
+            <a:ext cx="545342" cy="246221"/>
+          </a:xfrm>
+          <a:prstGeom prst="rect">
+            <a:avLst/>
+          </a:prstGeom>
+          <a:noFill/>
+        </p:spPr>
+        <p:txBody>
+          <a:bodyPr wrap="none" rtlCol="0">
+            <a:spAutoFit/>
+          </a:bodyPr>
+          <a:lstStyle/>
+          <a:p>
+            <a:r>
+              <a:rPr lang="en-GB" sz="1000" dirty="0"/>
+              <a:t>0.0396</a:t>
+            </a:r>
+          </a:p>
+        </p:txBody>
+      </p:sp>
+      <p:pic>
+        <p:nvPicPr>
+          <p:cNvPr id="61" name="Graphic 60" descr="Leaf outline">
+            <a:extLst>
+              <a:ext uri="{FF2B5EF4-FFF2-40B4-BE49-F238E27FC236}">
+                <a16:creationId xmlns:a16="http://schemas.microsoft.com/office/drawing/2014/main" id="{F88CB53A-5EAF-5CED-D35C-CAD09AFC5A47}"/>
+              </a:ext>
+            </a:extLst>
+          </p:cNvPr>
+          <p:cNvPicPr>
+            <a:picLocks noChangeAspect="1"/>
+          </p:cNvPicPr>
+          <p:nvPr/>
+        </p:nvPicPr>
+        <p:blipFill>
+          <a:blip r:embed="rId2">
+            <a:extLst>
+              <a:ext uri="{28A0092B-C50C-407E-A947-70E740481C1C}">
+                <a14:useLocalDpi xmlns:a14="http://schemas.microsoft.com/office/drawing/2010/main" val="0"/>
+              </a:ext>
+              <a:ext uri="{96DAC541-7B7A-43D3-8B79-37D633B846F1}">
+                <asvg:svgBlip xmlns:asvg="http://schemas.microsoft.com/office/drawing/2016/SVG/main" r:embed="rId3"/>
+              </a:ext>
+            </a:extLst>
+          </a:blip>
+          <a:stretch>
+            <a:fillRect/>
+          </a:stretch>
+        </p:blipFill>
+        <p:spPr>
+          <a:xfrm>
+            <a:off x="2156154" y="6191817"/>
+            <a:ext cx="677174" cy="677174"/>
+          </a:xfrm>
+          <a:prstGeom prst="rect">
+            <a:avLst/>
+          </a:prstGeom>
+        </p:spPr>
+      </p:pic>
+      <p:sp>
+        <p:nvSpPr>
+          <p:cNvPr id="62" name="TextBox 61">
+            <a:extLst>
+              <a:ext uri="{FF2B5EF4-FFF2-40B4-BE49-F238E27FC236}">
+                <a16:creationId xmlns:a16="http://schemas.microsoft.com/office/drawing/2014/main" id="{DA58C283-65D3-504D-B196-95E139B0EECE}"/>
+              </a:ext>
+            </a:extLst>
+          </p:cNvPr>
+          <p:cNvSpPr txBox="1"/>
+          <p:nvPr/>
+        </p:nvSpPr>
+        <p:spPr>
+          <a:xfrm>
+            <a:off x="2272280" y="6284183"/>
+            <a:ext cx="545342" cy="246221"/>
+          </a:xfrm>
+          <a:prstGeom prst="rect">
+            <a:avLst/>
+          </a:prstGeom>
+          <a:noFill/>
+        </p:spPr>
+        <p:txBody>
+          <a:bodyPr wrap="none" rtlCol="0">
+            <a:spAutoFit/>
+          </a:bodyPr>
+          <a:lstStyle/>
+          <a:p>
+            <a:r>
+              <a:rPr lang="en-GB" sz="1000" dirty="0"/>
+              <a:t>0.1019</a:t>
+            </a:r>
+          </a:p>
+        </p:txBody>
+      </p:sp>
+      <p:pic>
+        <p:nvPicPr>
+          <p:cNvPr id="64" name="Graphic 63" descr="Leaf outline">
+            <a:extLst>
+              <a:ext uri="{FF2B5EF4-FFF2-40B4-BE49-F238E27FC236}">
+                <a16:creationId xmlns:a16="http://schemas.microsoft.com/office/drawing/2014/main" id="{E7CBF1FB-F095-EBC5-B6FD-FAFBBD2DC217}"/>
+              </a:ext>
+            </a:extLst>
+          </p:cNvPr>
+          <p:cNvPicPr>
+            <a:picLocks noChangeAspect="1"/>
+          </p:cNvPicPr>
+          <p:nvPr/>
+        </p:nvPicPr>
+        <p:blipFill>
+          <a:blip r:embed="rId2">
+            <a:extLst>
+              <a:ext uri="{28A0092B-C50C-407E-A947-70E740481C1C}">
+                <a14:useLocalDpi xmlns:a14="http://schemas.microsoft.com/office/drawing/2010/main" val="0"/>
+              </a:ext>
+              <a:ext uri="{96DAC541-7B7A-43D3-8B79-37D633B846F1}">
+                <asvg:svgBlip xmlns:asvg="http://schemas.microsoft.com/office/drawing/2016/SVG/main" r:embed="rId3"/>
+              </a:ext>
+            </a:extLst>
+          </a:blip>
+          <a:stretch>
+            <a:fillRect/>
+          </a:stretch>
+        </p:blipFill>
+        <p:spPr>
+          <a:xfrm>
+            <a:off x="1276646" y="5341896"/>
+            <a:ext cx="677174" cy="677174"/>
+          </a:xfrm>
+          <a:prstGeom prst="rect">
+            <a:avLst/>
+          </a:prstGeom>
+        </p:spPr>
+      </p:pic>
+      <p:sp>
+        <p:nvSpPr>
+          <p:cNvPr id="65" name="TextBox 64">
+            <a:extLst>
+              <a:ext uri="{FF2B5EF4-FFF2-40B4-BE49-F238E27FC236}">
+                <a16:creationId xmlns:a16="http://schemas.microsoft.com/office/drawing/2014/main" id="{7E9F4B63-A3F9-F634-3067-3E6E07F87B16}"/>
+              </a:ext>
+            </a:extLst>
+          </p:cNvPr>
+          <p:cNvSpPr txBox="1"/>
+          <p:nvPr/>
+        </p:nvSpPr>
+        <p:spPr>
+          <a:xfrm>
+            <a:off x="1392772" y="5434262"/>
+            <a:ext cx="479618" cy="246221"/>
+          </a:xfrm>
+          <a:prstGeom prst="rect">
+            <a:avLst/>
+          </a:prstGeom>
+          <a:noFill/>
+        </p:spPr>
+        <p:txBody>
+          <a:bodyPr wrap="none" rtlCol="0">
+            <a:spAutoFit/>
+          </a:bodyPr>
+          <a:lstStyle/>
+          <a:p>
+            <a:r>
+              <a:rPr lang="en-GB" sz="1000" dirty="0"/>
+              <a:t>0.023</a:t>
+            </a:r>
+          </a:p>
+        </p:txBody>
+      </p:sp>
+      <p:cxnSp>
+        <p:nvCxnSpPr>
+          <p:cNvPr id="66" name="Straight Arrow Connector 65">
+            <a:extLst>
+              <a:ext uri="{FF2B5EF4-FFF2-40B4-BE49-F238E27FC236}">
+                <a16:creationId xmlns:a16="http://schemas.microsoft.com/office/drawing/2014/main" id="{8E88B961-4247-F88B-AF33-F71BB48FC57E}"/>
+              </a:ext>
+            </a:extLst>
+          </p:cNvPr>
+          <p:cNvCxnSpPr>
+            <a:cxnSpLocks/>
+          </p:cNvCxnSpPr>
+          <p:nvPr/>
+        </p:nvCxnSpPr>
+        <p:spPr>
+          <a:xfrm>
+            <a:off x="7473194" y="1929898"/>
+            <a:ext cx="387396" cy="383699"/>
+          </a:xfrm>
+          <a:prstGeom prst="straightConnector1">
+            <a:avLst/>
+          </a:prstGeom>
+          <a:ln>
+            <a:solidFill>
+              <a:schemeClr val="tx1"/>
+            </a:solidFill>
+            <a:tailEnd type="triangle"/>
+          </a:ln>
+        </p:spPr>
+        <p:style>
+          <a:lnRef idx="1">
+            <a:schemeClr val="accent1"/>
+          </a:lnRef>
+          <a:fillRef idx="0">
+            <a:schemeClr val="accent1"/>
+          </a:fillRef>
+          <a:effectRef idx="0">
+            <a:schemeClr val="accent1"/>
+          </a:effectRef>
+          <a:fontRef idx="minor">
+            <a:schemeClr val="tx1"/>
+          </a:fontRef>
+        </p:style>
+      </p:cxnSp>
+      <p:sp>
+        <p:nvSpPr>
+          <p:cNvPr id="67" name="TextBox 66">
+            <a:extLst>
+              <a:ext uri="{FF2B5EF4-FFF2-40B4-BE49-F238E27FC236}">
+                <a16:creationId xmlns:a16="http://schemas.microsoft.com/office/drawing/2014/main" id="{77EDBC2C-9ED4-3ABD-8D7B-0C4F658628C2}"/>
+              </a:ext>
+            </a:extLst>
+          </p:cNvPr>
+          <p:cNvSpPr txBox="1"/>
+          <p:nvPr/>
+        </p:nvSpPr>
+        <p:spPr>
+          <a:xfrm>
+            <a:off x="7574104" y="1929898"/>
+            <a:ext cx="369012" cy="246221"/>
+          </a:xfrm>
+          <a:prstGeom prst="rect">
+            <a:avLst/>
+          </a:prstGeom>
+          <a:noFill/>
+        </p:spPr>
+        <p:txBody>
+          <a:bodyPr wrap="none" rtlCol="0">
+            <a:spAutoFit/>
+          </a:bodyPr>
+          <a:lstStyle/>
+          <a:p>
+            <a:r>
+              <a:rPr lang="en-GB" sz="1000" dirty="0"/>
+              <a:t>YES</a:t>
+            </a:r>
+          </a:p>
+        </p:txBody>
+      </p:sp>
+      <p:sp>
+        <p:nvSpPr>
+          <p:cNvPr id="68" name="Oval 67">
+            <a:extLst>
+              <a:ext uri="{FF2B5EF4-FFF2-40B4-BE49-F238E27FC236}">
+                <a16:creationId xmlns:a16="http://schemas.microsoft.com/office/drawing/2014/main" id="{87A69BFA-AD92-F586-92E3-1937C32F96F1}"/>
+              </a:ext>
+            </a:extLst>
+          </p:cNvPr>
+          <p:cNvSpPr/>
+          <p:nvPr/>
+        </p:nvSpPr>
+        <p:spPr>
+          <a:xfrm>
+            <a:off x="7639279" y="2298557"/>
+            <a:ext cx="1345720" cy="520549"/>
+          </a:xfrm>
+          <a:prstGeom prst="ellipse">
+            <a:avLst/>
+          </a:prstGeom>
+          <a:noFill/>
+          <a:ln>
+            <a:solidFill>
+              <a:schemeClr val="tx1"/>
+            </a:solidFill>
+          </a:ln>
+        </p:spPr>
+        <p:style>
+          <a:lnRef idx="2">
+            <a:schemeClr val="accent1">
+              <a:shade val="50000"/>
+            </a:schemeClr>
+          </a:lnRef>
+          <a:fillRef idx="1">
+            <a:schemeClr val="accent1"/>
+          </a:fillRef>
+          <a:effectRef idx="0">
+            <a:schemeClr val="accent1"/>
+          </a:effectRef>
+          <a:fontRef idx="minor">
+            <a:schemeClr val="lt1"/>
+          </a:fontRef>
+        </p:style>
+        <p:txBody>
+          <a:bodyPr rtlCol="0" anchor="ctr"/>
+          <a:lstStyle/>
+          <a:p>
+            <a:pPr algn="ctr"/>
+            <a:r>
+              <a:rPr lang="en-GB" sz="1050" dirty="0">
+                <a:solidFill>
+                  <a:schemeClr val="tx1"/>
+                </a:solidFill>
+              </a:rPr>
+              <a:t>Time to Maturity </a:t>
+            </a:r>
+          </a:p>
+          <a:p>
+            <a:pPr algn="ctr"/>
+            <a:r>
+              <a:rPr lang="en-GB" sz="1050" dirty="0">
+                <a:solidFill>
+                  <a:schemeClr val="tx1"/>
+                </a:solidFill>
+              </a:rPr>
+              <a:t>&lt; 44.8</a:t>
+            </a:r>
+          </a:p>
+        </p:txBody>
+      </p:sp>
+      <p:cxnSp>
+        <p:nvCxnSpPr>
+          <p:cNvPr id="71" name="Straight Arrow Connector 70">
+            <a:extLst>
+              <a:ext uri="{FF2B5EF4-FFF2-40B4-BE49-F238E27FC236}">
+                <a16:creationId xmlns:a16="http://schemas.microsoft.com/office/drawing/2014/main" id="{C90B555F-EB99-C18C-4949-CCD3EB23427A}"/>
+              </a:ext>
+            </a:extLst>
+          </p:cNvPr>
+          <p:cNvCxnSpPr>
+            <a:cxnSpLocks/>
+          </p:cNvCxnSpPr>
+          <p:nvPr/>
+        </p:nvCxnSpPr>
+        <p:spPr>
+          <a:xfrm>
+            <a:off x="8884089" y="2860948"/>
+            <a:ext cx="387396" cy="383699"/>
+          </a:xfrm>
+          <a:prstGeom prst="straightConnector1">
+            <a:avLst/>
+          </a:prstGeom>
+          <a:ln>
+            <a:solidFill>
+              <a:schemeClr val="tx1"/>
+            </a:solidFill>
+            <a:tailEnd type="triangle"/>
+          </a:ln>
+        </p:spPr>
+        <p:style>
+          <a:lnRef idx="1">
+            <a:schemeClr val="accent1"/>
+          </a:lnRef>
+          <a:fillRef idx="0">
+            <a:schemeClr val="accent1"/>
+          </a:fillRef>
+          <a:effectRef idx="0">
+            <a:schemeClr val="accent1"/>
+          </a:effectRef>
+          <a:fontRef idx="minor">
+            <a:schemeClr val="tx1"/>
+          </a:fontRef>
+        </p:style>
+      </p:cxnSp>
+      <p:sp>
+        <p:nvSpPr>
+          <p:cNvPr id="72" name="TextBox 71">
+            <a:extLst>
+              <a:ext uri="{FF2B5EF4-FFF2-40B4-BE49-F238E27FC236}">
+                <a16:creationId xmlns:a16="http://schemas.microsoft.com/office/drawing/2014/main" id="{DDC124B2-C3C2-9227-2EF6-DB8C643BDCDD}"/>
+              </a:ext>
+            </a:extLst>
+          </p:cNvPr>
+          <p:cNvSpPr txBox="1"/>
+          <p:nvPr/>
+        </p:nvSpPr>
+        <p:spPr>
+          <a:xfrm>
+            <a:off x="8984999" y="2860948"/>
+            <a:ext cx="369012" cy="246221"/>
+          </a:xfrm>
+          <a:prstGeom prst="rect">
+            <a:avLst/>
+          </a:prstGeom>
+          <a:noFill/>
+        </p:spPr>
+        <p:txBody>
+          <a:bodyPr wrap="none" rtlCol="0">
+            <a:spAutoFit/>
+          </a:bodyPr>
+          <a:lstStyle/>
+          <a:p>
+            <a:r>
+              <a:rPr lang="en-GB" sz="1000" dirty="0"/>
+              <a:t>YES</a:t>
+            </a:r>
+          </a:p>
+        </p:txBody>
+      </p:sp>
+      <p:sp>
+        <p:nvSpPr>
+          <p:cNvPr id="73" name="Oval 72">
+            <a:extLst>
+              <a:ext uri="{FF2B5EF4-FFF2-40B4-BE49-F238E27FC236}">
+                <a16:creationId xmlns:a16="http://schemas.microsoft.com/office/drawing/2014/main" id="{C65268D9-739B-7358-27F7-95EA5AB84EAF}"/>
+              </a:ext>
+            </a:extLst>
+          </p:cNvPr>
+          <p:cNvSpPr/>
+          <p:nvPr/>
+        </p:nvSpPr>
+        <p:spPr>
+          <a:xfrm>
+            <a:off x="9013919" y="3348696"/>
+            <a:ext cx="1345720" cy="520549"/>
+          </a:xfrm>
+          <a:prstGeom prst="ellipse">
+            <a:avLst/>
+          </a:prstGeom>
+          <a:noFill/>
+          <a:ln>
+            <a:solidFill>
+              <a:schemeClr val="tx1"/>
+            </a:solidFill>
+          </a:ln>
+        </p:spPr>
+        <p:style>
+          <a:lnRef idx="2">
+            <a:schemeClr val="accent1">
+              <a:shade val="50000"/>
+            </a:schemeClr>
+          </a:lnRef>
+          <a:fillRef idx="1">
+            <a:schemeClr val="accent1"/>
+          </a:fillRef>
+          <a:effectRef idx="0">
+            <a:schemeClr val="accent1"/>
+          </a:effectRef>
+          <a:fontRef idx="minor">
+            <a:schemeClr val="lt1"/>
+          </a:fontRef>
+        </p:style>
+        <p:txBody>
+          <a:bodyPr rtlCol="0" anchor="ctr"/>
+          <a:lstStyle/>
+          <a:p>
+            <a:pPr algn="ctr"/>
+            <a:r>
+              <a:rPr lang="en-GB" sz="1050" dirty="0">
+                <a:solidFill>
+                  <a:schemeClr val="tx1"/>
+                </a:solidFill>
+              </a:rPr>
+              <a:t>Time to Maturity </a:t>
+            </a:r>
+          </a:p>
+          <a:p>
+            <a:pPr algn="ctr"/>
+            <a:r>
+              <a:rPr lang="en-GB" sz="1050" dirty="0">
+                <a:solidFill>
+                  <a:schemeClr val="tx1"/>
+                </a:solidFill>
+              </a:rPr>
+              <a:t>&lt; 40.02</a:t>
+            </a:r>
+          </a:p>
+        </p:txBody>
+      </p:sp>
+      <p:cxnSp>
+        <p:nvCxnSpPr>
+          <p:cNvPr id="74" name="Straight Arrow Connector 73">
+            <a:extLst>
+              <a:ext uri="{FF2B5EF4-FFF2-40B4-BE49-F238E27FC236}">
+                <a16:creationId xmlns:a16="http://schemas.microsoft.com/office/drawing/2014/main" id="{5FDB6CBF-469B-5D0F-8BE5-6C97826FAFA9}"/>
+              </a:ext>
+            </a:extLst>
+          </p:cNvPr>
+          <p:cNvCxnSpPr>
+            <a:cxnSpLocks/>
+          </p:cNvCxnSpPr>
+          <p:nvPr/>
+        </p:nvCxnSpPr>
+        <p:spPr>
+          <a:xfrm flipH="1">
+            <a:off x="6757801" y="1951361"/>
+            <a:ext cx="294090" cy="383699"/>
+          </a:xfrm>
+          <a:prstGeom prst="straightConnector1">
+            <a:avLst/>
+          </a:prstGeom>
+          <a:ln>
+            <a:solidFill>
+              <a:schemeClr val="tx1"/>
+            </a:solidFill>
+            <a:tailEnd type="triangle"/>
+          </a:ln>
+        </p:spPr>
+        <p:style>
+          <a:lnRef idx="1">
+            <a:schemeClr val="accent1"/>
+          </a:lnRef>
+          <a:fillRef idx="0">
+            <a:schemeClr val="accent1"/>
+          </a:fillRef>
+          <a:effectRef idx="0">
+            <a:schemeClr val="accent1"/>
+          </a:effectRef>
+          <a:fontRef idx="minor">
+            <a:schemeClr val="tx1"/>
+          </a:fontRef>
+        </p:style>
+      </p:cxnSp>
+      <p:sp>
+        <p:nvSpPr>
+          <p:cNvPr id="75" name="TextBox 74">
+            <a:extLst>
+              <a:ext uri="{FF2B5EF4-FFF2-40B4-BE49-F238E27FC236}">
+                <a16:creationId xmlns:a16="http://schemas.microsoft.com/office/drawing/2014/main" id="{FF6B7413-E04D-15A1-AB5D-F6BC864A49D4}"/>
+              </a:ext>
+            </a:extLst>
+          </p:cNvPr>
+          <p:cNvSpPr txBox="1"/>
+          <p:nvPr/>
+        </p:nvSpPr>
+        <p:spPr>
+          <a:xfrm>
+            <a:off x="6621962" y="1947313"/>
+            <a:ext cx="352982" cy="246221"/>
+          </a:xfrm>
+          <a:prstGeom prst="rect">
+            <a:avLst/>
+          </a:prstGeom>
+          <a:noFill/>
+        </p:spPr>
+        <p:txBody>
+          <a:bodyPr wrap="none" rtlCol="0">
+            <a:spAutoFit/>
+          </a:bodyPr>
+          <a:lstStyle/>
+          <a:p>
+            <a:r>
+              <a:rPr lang="en-GB" sz="1000" dirty="0"/>
+              <a:t>NO</a:t>
+            </a:r>
+          </a:p>
+        </p:txBody>
+      </p:sp>
+      <p:sp>
+        <p:nvSpPr>
+          <p:cNvPr id="76" name="Oval 75">
+            <a:extLst>
+              <a:ext uri="{FF2B5EF4-FFF2-40B4-BE49-F238E27FC236}">
+                <a16:creationId xmlns:a16="http://schemas.microsoft.com/office/drawing/2014/main" id="{2BF8AF6B-6189-8BA6-A264-A41E33D0A4C2}"/>
+              </a:ext>
+            </a:extLst>
+          </p:cNvPr>
+          <p:cNvSpPr/>
+          <p:nvPr/>
+        </p:nvSpPr>
+        <p:spPr>
+          <a:xfrm>
+            <a:off x="5949102" y="2298557"/>
+            <a:ext cx="1345720" cy="520549"/>
+          </a:xfrm>
+          <a:prstGeom prst="ellipse">
+            <a:avLst/>
+          </a:prstGeom>
+          <a:noFill/>
+          <a:ln>
+            <a:solidFill>
+              <a:schemeClr val="tx1"/>
+            </a:solidFill>
+          </a:ln>
+        </p:spPr>
+        <p:style>
+          <a:lnRef idx="2">
+            <a:schemeClr val="accent1">
+              <a:shade val="50000"/>
+            </a:schemeClr>
+          </a:lnRef>
+          <a:fillRef idx="1">
+            <a:schemeClr val="accent1"/>
+          </a:fillRef>
+          <a:effectRef idx="0">
+            <a:schemeClr val="accent1"/>
+          </a:effectRef>
+          <a:fontRef idx="minor">
+            <a:schemeClr val="lt1"/>
+          </a:fontRef>
+        </p:style>
+        <p:txBody>
+          <a:bodyPr rtlCol="0" anchor="ctr"/>
+          <a:lstStyle/>
+          <a:p>
+            <a:pPr algn="ctr"/>
+            <a:r>
+              <a:rPr lang="en-GB" sz="1050" dirty="0">
+                <a:solidFill>
+                  <a:schemeClr val="tx1"/>
+                </a:solidFill>
+              </a:rPr>
+              <a:t>VIX CLOSE</a:t>
+            </a:r>
+          </a:p>
+          <a:p>
+            <a:pPr algn="ctr"/>
+            <a:r>
+              <a:rPr lang="en-GB" sz="1050" dirty="0">
+                <a:solidFill>
+                  <a:schemeClr val="tx1"/>
+                </a:solidFill>
+              </a:rPr>
+              <a:t>&lt; 25</a:t>
+            </a:r>
+          </a:p>
+        </p:txBody>
+      </p:sp>
+      <p:cxnSp>
+        <p:nvCxnSpPr>
+          <p:cNvPr id="77" name="Straight Arrow Connector 76">
+            <a:extLst>
+              <a:ext uri="{FF2B5EF4-FFF2-40B4-BE49-F238E27FC236}">
+                <a16:creationId xmlns:a16="http://schemas.microsoft.com/office/drawing/2014/main" id="{0E119494-2535-A5E1-7CDE-FBB362C04605}"/>
+              </a:ext>
+            </a:extLst>
+          </p:cNvPr>
+          <p:cNvCxnSpPr>
+            <a:cxnSpLocks/>
+          </p:cNvCxnSpPr>
+          <p:nvPr/>
+        </p:nvCxnSpPr>
+        <p:spPr>
+          <a:xfrm>
+            <a:off x="6683388" y="2933905"/>
+            <a:ext cx="387396" cy="383699"/>
+          </a:xfrm>
+          <a:prstGeom prst="straightConnector1">
+            <a:avLst/>
+          </a:prstGeom>
+          <a:ln>
+            <a:solidFill>
+              <a:schemeClr val="tx1"/>
+            </a:solidFill>
+            <a:tailEnd type="triangle"/>
+          </a:ln>
+        </p:spPr>
+        <p:style>
+          <a:lnRef idx="1">
+            <a:schemeClr val="accent1"/>
+          </a:lnRef>
+          <a:fillRef idx="0">
+            <a:schemeClr val="accent1"/>
+          </a:fillRef>
+          <a:effectRef idx="0">
+            <a:schemeClr val="accent1"/>
+          </a:effectRef>
+          <a:fontRef idx="minor">
+            <a:schemeClr val="tx1"/>
+          </a:fontRef>
+        </p:style>
+      </p:cxnSp>
+      <p:sp>
+        <p:nvSpPr>
+          <p:cNvPr id="78" name="TextBox 77">
+            <a:extLst>
+              <a:ext uri="{FF2B5EF4-FFF2-40B4-BE49-F238E27FC236}">
+                <a16:creationId xmlns:a16="http://schemas.microsoft.com/office/drawing/2014/main" id="{F7412CD7-8A12-F8DD-34B3-F543D20DFA35}"/>
+              </a:ext>
+            </a:extLst>
+          </p:cNvPr>
+          <p:cNvSpPr txBox="1"/>
+          <p:nvPr/>
+        </p:nvSpPr>
+        <p:spPr>
+          <a:xfrm>
+            <a:off x="6784298" y="2933905"/>
+            <a:ext cx="369012" cy="246221"/>
+          </a:xfrm>
+          <a:prstGeom prst="rect">
+            <a:avLst/>
+          </a:prstGeom>
+          <a:noFill/>
+        </p:spPr>
+        <p:txBody>
+          <a:bodyPr wrap="none" rtlCol="0">
+            <a:spAutoFit/>
+          </a:bodyPr>
+          <a:lstStyle/>
+          <a:p>
+            <a:r>
+              <a:rPr lang="en-GB" sz="1000" dirty="0"/>
+              <a:t>YES</a:t>
+            </a:r>
+          </a:p>
+        </p:txBody>
+      </p:sp>
+      <p:cxnSp>
+        <p:nvCxnSpPr>
+          <p:cNvPr id="79" name="Straight Arrow Connector 78">
+            <a:extLst>
+              <a:ext uri="{FF2B5EF4-FFF2-40B4-BE49-F238E27FC236}">
+                <a16:creationId xmlns:a16="http://schemas.microsoft.com/office/drawing/2014/main" id="{5E5E99A0-E55E-387A-D2F6-278CA4B3751F}"/>
+              </a:ext>
+            </a:extLst>
+          </p:cNvPr>
+          <p:cNvCxnSpPr>
+            <a:cxnSpLocks/>
+          </p:cNvCxnSpPr>
+          <p:nvPr/>
+        </p:nvCxnSpPr>
+        <p:spPr>
+          <a:xfrm flipH="1">
+            <a:off x="6231839" y="2922359"/>
+            <a:ext cx="294090" cy="383699"/>
+          </a:xfrm>
+          <a:prstGeom prst="straightConnector1">
+            <a:avLst/>
+          </a:prstGeom>
+          <a:ln>
+            <a:solidFill>
+              <a:schemeClr val="tx1"/>
+            </a:solidFill>
+            <a:tailEnd type="triangle"/>
+          </a:ln>
+        </p:spPr>
+        <p:style>
+          <a:lnRef idx="1">
+            <a:schemeClr val="accent1"/>
+          </a:lnRef>
+          <a:fillRef idx="0">
+            <a:schemeClr val="accent1"/>
+          </a:fillRef>
+          <a:effectRef idx="0">
+            <a:schemeClr val="accent1"/>
+          </a:effectRef>
+          <a:fontRef idx="minor">
+            <a:schemeClr val="tx1"/>
+          </a:fontRef>
+        </p:style>
+      </p:cxnSp>
+      <p:sp>
+        <p:nvSpPr>
+          <p:cNvPr id="80" name="TextBox 79">
+            <a:extLst>
+              <a:ext uri="{FF2B5EF4-FFF2-40B4-BE49-F238E27FC236}">
+                <a16:creationId xmlns:a16="http://schemas.microsoft.com/office/drawing/2014/main" id="{11926E81-EF92-FAAA-592E-7AEADC2DB31E}"/>
+              </a:ext>
+            </a:extLst>
+          </p:cNvPr>
+          <p:cNvSpPr txBox="1"/>
+          <p:nvPr/>
+        </p:nvSpPr>
+        <p:spPr>
+          <a:xfrm>
+            <a:off x="6096000" y="2918311"/>
+            <a:ext cx="352982" cy="246221"/>
+          </a:xfrm>
+          <a:prstGeom prst="rect">
+            <a:avLst/>
+          </a:prstGeom>
+          <a:noFill/>
+        </p:spPr>
+        <p:txBody>
+          <a:bodyPr wrap="none" rtlCol="0">
+            <a:spAutoFit/>
+          </a:bodyPr>
+          <a:lstStyle/>
+          <a:p>
+            <a:r>
+              <a:rPr lang="en-GB" sz="1000" dirty="0"/>
+              <a:t>NO</a:t>
+            </a:r>
+          </a:p>
+        </p:txBody>
+      </p:sp>
+      <p:sp>
+        <p:nvSpPr>
+          <p:cNvPr id="82" name="Oval 81">
+            <a:extLst>
+              <a:ext uri="{FF2B5EF4-FFF2-40B4-BE49-F238E27FC236}">
+                <a16:creationId xmlns:a16="http://schemas.microsoft.com/office/drawing/2014/main" id="{8A40E2C3-2409-B9B1-B74C-7DC55F3EC574}"/>
+              </a:ext>
+            </a:extLst>
+          </p:cNvPr>
+          <p:cNvSpPr/>
+          <p:nvPr/>
+        </p:nvSpPr>
+        <p:spPr>
+          <a:xfrm>
+            <a:off x="6872319" y="3373679"/>
+            <a:ext cx="1345720" cy="520549"/>
+          </a:xfrm>
+          <a:prstGeom prst="ellipse">
+            <a:avLst/>
+          </a:prstGeom>
+          <a:noFill/>
+          <a:ln>
+            <a:solidFill>
+              <a:schemeClr val="tx1"/>
+            </a:solidFill>
+          </a:ln>
+        </p:spPr>
+        <p:style>
+          <a:lnRef idx="2">
+            <a:schemeClr val="accent1">
+              <a:shade val="50000"/>
+            </a:schemeClr>
+          </a:lnRef>
+          <a:fillRef idx="1">
+            <a:schemeClr val="accent1"/>
+          </a:fillRef>
+          <a:effectRef idx="0">
+            <a:schemeClr val="accent1"/>
+          </a:effectRef>
+          <a:fontRef idx="minor">
+            <a:schemeClr val="lt1"/>
+          </a:fontRef>
+        </p:style>
+        <p:txBody>
+          <a:bodyPr rtlCol="0" anchor="ctr"/>
+          <a:lstStyle/>
+          <a:p>
+            <a:pPr algn="ctr"/>
+            <a:r>
+              <a:rPr lang="en-GB" sz="1050" dirty="0">
+                <a:solidFill>
+                  <a:schemeClr val="tx1"/>
+                </a:solidFill>
+              </a:rPr>
+              <a:t>1Y Gov Yield</a:t>
+            </a:r>
+          </a:p>
+          <a:p>
+            <a:pPr algn="ctr"/>
+            <a:r>
+              <a:rPr lang="en-GB" sz="1050" dirty="0">
+                <a:solidFill>
+                  <a:schemeClr val="tx1"/>
+                </a:solidFill>
+              </a:rPr>
+              <a:t>&lt; 1.057</a:t>
+            </a:r>
+          </a:p>
+        </p:txBody>
+      </p:sp>
+      <p:sp>
+        <p:nvSpPr>
+          <p:cNvPr id="83" name="Oval 82">
+            <a:extLst>
+              <a:ext uri="{FF2B5EF4-FFF2-40B4-BE49-F238E27FC236}">
+                <a16:creationId xmlns:a16="http://schemas.microsoft.com/office/drawing/2014/main" id="{8B212C11-7EC5-D913-01C1-22A3218B29E6}"/>
+              </a:ext>
+            </a:extLst>
+          </p:cNvPr>
+          <p:cNvSpPr/>
+          <p:nvPr/>
+        </p:nvSpPr>
+        <p:spPr>
+          <a:xfrm>
+            <a:off x="5411818" y="3399277"/>
+            <a:ext cx="1345720" cy="520549"/>
+          </a:xfrm>
+          <a:prstGeom prst="ellipse">
+            <a:avLst/>
+          </a:prstGeom>
+          <a:noFill/>
+          <a:ln>
+            <a:solidFill>
+              <a:schemeClr val="tx1"/>
+            </a:solidFill>
+          </a:ln>
+        </p:spPr>
+        <p:style>
+          <a:lnRef idx="2">
+            <a:schemeClr val="accent1">
+              <a:shade val="50000"/>
+            </a:schemeClr>
+          </a:lnRef>
+          <a:fillRef idx="1">
+            <a:schemeClr val="accent1"/>
+          </a:fillRef>
+          <a:effectRef idx="0">
+            <a:schemeClr val="accent1"/>
+          </a:effectRef>
+          <a:fontRef idx="minor">
+            <a:schemeClr val="lt1"/>
+          </a:fontRef>
+        </p:style>
+        <p:txBody>
+          <a:bodyPr rtlCol="0" anchor="ctr"/>
+          <a:lstStyle/>
+          <a:p>
+            <a:pPr algn="ctr"/>
+            <a:r>
+              <a:rPr lang="en-GB" sz="1050" dirty="0">
+                <a:solidFill>
+                  <a:schemeClr val="tx1"/>
+                </a:solidFill>
+              </a:rPr>
+              <a:t>FTSE 100 </a:t>
+            </a:r>
+            <a:r>
+              <a:rPr lang="en-GB" sz="1050" dirty="0" err="1">
+                <a:solidFill>
+                  <a:schemeClr val="tx1"/>
+                </a:solidFill>
+              </a:rPr>
+              <a:t>StDev</a:t>
+            </a:r>
+            <a:endParaRPr lang="en-GB" sz="1050" dirty="0">
+              <a:solidFill>
+                <a:schemeClr val="tx1"/>
+              </a:solidFill>
+            </a:endParaRPr>
+          </a:p>
+          <a:p>
+            <a:pPr algn="ctr"/>
+            <a:r>
+              <a:rPr lang="en-GB" sz="1050" dirty="0">
+                <a:solidFill>
+                  <a:schemeClr val="tx1"/>
+                </a:solidFill>
+              </a:rPr>
+              <a:t>&lt; 0.95</a:t>
+            </a:r>
+          </a:p>
+        </p:txBody>
+      </p:sp>
+      <p:cxnSp>
+        <p:nvCxnSpPr>
+          <p:cNvPr id="85" name="Straight Arrow Connector 84">
+            <a:extLst>
+              <a:ext uri="{FF2B5EF4-FFF2-40B4-BE49-F238E27FC236}">
+                <a16:creationId xmlns:a16="http://schemas.microsoft.com/office/drawing/2014/main" id="{CAA4A177-B19E-BAA5-CDE7-A359A60089C5}"/>
+              </a:ext>
+            </a:extLst>
+          </p:cNvPr>
+          <p:cNvCxnSpPr>
+            <a:cxnSpLocks/>
+          </p:cNvCxnSpPr>
+          <p:nvPr/>
+        </p:nvCxnSpPr>
+        <p:spPr>
+          <a:xfrm>
+            <a:off x="6413171" y="4006334"/>
+            <a:ext cx="387396" cy="383699"/>
+          </a:xfrm>
+          <a:prstGeom prst="straightConnector1">
+            <a:avLst/>
+          </a:prstGeom>
+          <a:ln>
+            <a:solidFill>
+              <a:schemeClr val="tx1"/>
+            </a:solidFill>
+            <a:tailEnd type="triangle"/>
+          </a:ln>
+        </p:spPr>
+        <p:style>
+          <a:lnRef idx="1">
+            <a:schemeClr val="accent1"/>
+          </a:lnRef>
+          <a:fillRef idx="0">
+            <a:schemeClr val="accent1"/>
+          </a:fillRef>
+          <a:effectRef idx="0">
+            <a:schemeClr val="accent1"/>
+          </a:effectRef>
+          <a:fontRef idx="minor">
+            <a:schemeClr val="tx1"/>
+          </a:fontRef>
+        </p:style>
+      </p:cxnSp>
+      <p:sp>
+        <p:nvSpPr>
+          <p:cNvPr id="86" name="TextBox 85">
+            <a:extLst>
+              <a:ext uri="{FF2B5EF4-FFF2-40B4-BE49-F238E27FC236}">
+                <a16:creationId xmlns:a16="http://schemas.microsoft.com/office/drawing/2014/main" id="{17E956FA-DBF9-DBA0-1930-A7EB50FDC01E}"/>
+              </a:ext>
+            </a:extLst>
+          </p:cNvPr>
+          <p:cNvSpPr txBox="1"/>
+          <p:nvPr/>
+        </p:nvSpPr>
+        <p:spPr>
+          <a:xfrm>
+            <a:off x="6514081" y="4006334"/>
+            <a:ext cx="369012" cy="246221"/>
+          </a:xfrm>
+          <a:prstGeom prst="rect">
+            <a:avLst/>
+          </a:prstGeom>
+          <a:noFill/>
+        </p:spPr>
+        <p:txBody>
+          <a:bodyPr wrap="none" rtlCol="0">
+            <a:spAutoFit/>
+          </a:bodyPr>
+          <a:lstStyle/>
+          <a:p>
+            <a:r>
+              <a:rPr lang="en-GB" sz="1000" dirty="0"/>
+              <a:t>YES</a:t>
+            </a:r>
+          </a:p>
+        </p:txBody>
+      </p:sp>
+      <p:cxnSp>
+        <p:nvCxnSpPr>
+          <p:cNvPr id="87" name="Straight Arrow Connector 86">
+            <a:extLst>
+              <a:ext uri="{FF2B5EF4-FFF2-40B4-BE49-F238E27FC236}">
+                <a16:creationId xmlns:a16="http://schemas.microsoft.com/office/drawing/2014/main" id="{85B3C8E0-AE08-D7C6-8483-8CB061F42CD5}"/>
+              </a:ext>
+            </a:extLst>
+          </p:cNvPr>
+          <p:cNvCxnSpPr>
+            <a:cxnSpLocks/>
+          </p:cNvCxnSpPr>
+          <p:nvPr/>
+        </p:nvCxnSpPr>
+        <p:spPr>
+          <a:xfrm flipH="1">
+            <a:off x="5935744" y="4012040"/>
+            <a:ext cx="294090" cy="383699"/>
+          </a:xfrm>
+          <a:prstGeom prst="straightConnector1">
+            <a:avLst/>
+          </a:prstGeom>
+          <a:ln>
+            <a:solidFill>
+              <a:schemeClr val="tx1"/>
+            </a:solidFill>
+            <a:tailEnd type="triangle"/>
+          </a:ln>
+        </p:spPr>
+        <p:style>
+          <a:lnRef idx="1">
+            <a:schemeClr val="accent1"/>
+          </a:lnRef>
+          <a:fillRef idx="0">
+            <a:schemeClr val="accent1"/>
+          </a:fillRef>
+          <a:effectRef idx="0">
+            <a:schemeClr val="accent1"/>
+          </a:effectRef>
+          <a:fontRef idx="minor">
+            <a:schemeClr val="tx1"/>
+          </a:fontRef>
+        </p:style>
+      </p:cxnSp>
+      <p:sp>
+        <p:nvSpPr>
+          <p:cNvPr id="88" name="TextBox 87">
+            <a:extLst>
+              <a:ext uri="{FF2B5EF4-FFF2-40B4-BE49-F238E27FC236}">
+                <a16:creationId xmlns:a16="http://schemas.microsoft.com/office/drawing/2014/main" id="{04DF994B-F25F-0AC4-5733-1796F62B6C57}"/>
+              </a:ext>
+            </a:extLst>
+          </p:cNvPr>
+          <p:cNvSpPr txBox="1"/>
+          <p:nvPr/>
+        </p:nvSpPr>
+        <p:spPr>
+          <a:xfrm>
+            <a:off x="5799905" y="4007992"/>
+            <a:ext cx="352982" cy="246221"/>
+          </a:xfrm>
+          <a:prstGeom prst="rect">
+            <a:avLst/>
+          </a:prstGeom>
+          <a:noFill/>
+        </p:spPr>
+        <p:txBody>
+          <a:bodyPr wrap="none" rtlCol="0">
+            <a:spAutoFit/>
+          </a:bodyPr>
+          <a:lstStyle/>
+          <a:p>
+            <a:r>
+              <a:rPr lang="en-GB" sz="1000" dirty="0"/>
+              <a:t>NO</a:t>
+            </a:r>
+          </a:p>
+        </p:txBody>
+      </p:sp>
+      <p:sp>
+        <p:nvSpPr>
+          <p:cNvPr id="89" name="TextBox 88">
+            <a:extLst>
+              <a:ext uri="{FF2B5EF4-FFF2-40B4-BE49-F238E27FC236}">
+                <a16:creationId xmlns:a16="http://schemas.microsoft.com/office/drawing/2014/main" id="{16EA46CE-0E17-D5B8-64CB-0F6437085B23}"/>
+              </a:ext>
+            </a:extLst>
+          </p:cNvPr>
+          <p:cNvSpPr txBox="1"/>
+          <p:nvPr/>
+        </p:nvSpPr>
+        <p:spPr>
+          <a:xfrm flipV="1">
+            <a:off x="5729807" y="4470853"/>
+            <a:ext cx="352982" cy="369332"/>
+          </a:xfrm>
+          <a:prstGeom prst="rect">
+            <a:avLst/>
+          </a:prstGeom>
+          <a:noFill/>
+        </p:spPr>
+        <p:txBody>
+          <a:bodyPr wrap="square" rtlCol="0">
+            <a:spAutoFit/>
+          </a:bodyPr>
+          <a:lstStyle/>
+          <a:p>
+            <a:r>
+              <a:rPr lang="en-GB" dirty="0"/>
+              <a:t>…</a:t>
+            </a:r>
+          </a:p>
+        </p:txBody>
+      </p:sp>
+      <p:sp>
+        <p:nvSpPr>
+          <p:cNvPr id="93" name="TextBox 92">
+            <a:extLst>
+              <a:ext uri="{FF2B5EF4-FFF2-40B4-BE49-F238E27FC236}">
+                <a16:creationId xmlns:a16="http://schemas.microsoft.com/office/drawing/2014/main" id="{95622445-B1B8-CC8C-3DFE-84E7FA624984}"/>
+              </a:ext>
+            </a:extLst>
+          </p:cNvPr>
+          <p:cNvSpPr txBox="1"/>
+          <p:nvPr/>
+        </p:nvSpPr>
+        <p:spPr>
+          <a:xfrm flipV="1">
+            <a:off x="6652933" y="4470853"/>
+            <a:ext cx="352982" cy="369332"/>
+          </a:xfrm>
+          <a:prstGeom prst="rect">
+            <a:avLst/>
+          </a:prstGeom>
+          <a:noFill/>
+        </p:spPr>
+        <p:txBody>
+          <a:bodyPr wrap="square" rtlCol="0">
+            <a:spAutoFit/>
+          </a:bodyPr>
+          <a:lstStyle/>
+          <a:p>
+            <a:r>
+              <a:rPr lang="en-GB" dirty="0"/>
+              <a:t>…</a:t>
+            </a:r>
+          </a:p>
+        </p:txBody>
+      </p:sp>
+      <p:cxnSp>
+        <p:nvCxnSpPr>
+          <p:cNvPr id="94" name="Straight Arrow Connector 93">
+            <a:extLst>
+              <a:ext uri="{FF2B5EF4-FFF2-40B4-BE49-F238E27FC236}">
+                <a16:creationId xmlns:a16="http://schemas.microsoft.com/office/drawing/2014/main" id="{A68345C9-A477-6840-94C0-2D6CFFF12A8D}"/>
+              </a:ext>
+            </a:extLst>
+          </p:cNvPr>
+          <p:cNvCxnSpPr>
+            <a:cxnSpLocks/>
+          </p:cNvCxnSpPr>
+          <p:nvPr/>
+        </p:nvCxnSpPr>
+        <p:spPr>
+          <a:xfrm flipH="1">
+            <a:off x="8359148" y="2910147"/>
+            <a:ext cx="294090" cy="383699"/>
+          </a:xfrm>
+          <a:prstGeom prst="straightConnector1">
+            <a:avLst/>
+          </a:prstGeom>
+          <a:ln>
+            <a:solidFill>
+              <a:schemeClr val="tx1"/>
+            </a:solidFill>
+            <a:tailEnd type="triangle"/>
+          </a:ln>
+        </p:spPr>
+        <p:style>
+          <a:lnRef idx="1">
+            <a:schemeClr val="accent1"/>
+          </a:lnRef>
+          <a:fillRef idx="0">
+            <a:schemeClr val="accent1"/>
+          </a:fillRef>
+          <a:effectRef idx="0">
+            <a:schemeClr val="accent1"/>
+          </a:effectRef>
+          <a:fontRef idx="minor">
+            <a:schemeClr val="tx1"/>
+          </a:fontRef>
+        </p:style>
+      </p:cxnSp>
+      <p:sp>
+        <p:nvSpPr>
+          <p:cNvPr id="95" name="TextBox 94">
+            <a:extLst>
+              <a:ext uri="{FF2B5EF4-FFF2-40B4-BE49-F238E27FC236}">
+                <a16:creationId xmlns:a16="http://schemas.microsoft.com/office/drawing/2014/main" id="{E8015F45-5FBA-9424-684A-DA3F6ECC3741}"/>
+              </a:ext>
+            </a:extLst>
+          </p:cNvPr>
+          <p:cNvSpPr txBox="1"/>
+          <p:nvPr/>
+        </p:nvSpPr>
+        <p:spPr>
+          <a:xfrm>
+            <a:off x="8223309" y="2906099"/>
+            <a:ext cx="352982" cy="246221"/>
+          </a:xfrm>
+          <a:prstGeom prst="rect">
+            <a:avLst/>
+          </a:prstGeom>
+          <a:noFill/>
+        </p:spPr>
+        <p:txBody>
+          <a:bodyPr wrap="none" rtlCol="0">
+            <a:spAutoFit/>
+          </a:bodyPr>
+          <a:lstStyle/>
+          <a:p>
+            <a:r>
+              <a:rPr lang="en-GB" sz="1000" dirty="0"/>
+              <a:t>NO</a:t>
+            </a:r>
+          </a:p>
+        </p:txBody>
+      </p:sp>
+      <p:cxnSp>
+        <p:nvCxnSpPr>
+          <p:cNvPr id="97" name="Straight Arrow Connector 96">
+            <a:extLst>
+              <a:ext uri="{FF2B5EF4-FFF2-40B4-BE49-F238E27FC236}">
+                <a16:creationId xmlns:a16="http://schemas.microsoft.com/office/drawing/2014/main" id="{12D21674-AD1B-B110-2584-263B69D9F01A}"/>
+              </a:ext>
+            </a:extLst>
+          </p:cNvPr>
+          <p:cNvCxnSpPr>
+            <a:cxnSpLocks/>
+          </p:cNvCxnSpPr>
+          <p:nvPr/>
+        </p:nvCxnSpPr>
+        <p:spPr>
+          <a:xfrm>
+            <a:off x="7857294" y="3996241"/>
+            <a:ext cx="387396" cy="383699"/>
+          </a:xfrm>
+          <a:prstGeom prst="straightConnector1">
+            <a:avLst/>
+          </a:prstGeom>
+          <a:ln>
+            <a:solidFill>
+              <a:schemeClr val="tx1"/>
+            </a:solidFill>
+            <a:tailEnd type="triangle"/>
+          </a:ln>
+        </p:spPr>
+        <p:style>
+          <a:lnRef idx="1">
+            <a:schemeClr val="accent1"/>
+          </a:lnRef>
+          <a:fillRef idx="0">
+            <a:schemeClr val="accent1"/>
+          </a:fillRef>
+          <a:effectRef idx="0">
+            <a:schemeClr val="accent1"/>
+          </a:effectRef>
+          <a:fontRef idx="minor">
+            <a:schemeClr val="tx1"/>
+          </a:fontRef>
+        </p:style>
+      </p:cxnSp>
+      <p:sp>
+        <p:nvSpPr>
+          <p:cNvPr id="98" name="TextBox 97">
+            <a:extLst>
+              <a:ext uri="{FF2B5EF4-FFF2-40B4-BE49-F238E27FC236}">
+                <a16:creationId xmlns:a16="http://schemas.microsoft.com/office/drawing/2014/main" id="{AB82343A-B22A-519F-92CD-FA7560204523}"/>
+              </a:ext>
+            </a:extLst>
+          </p:cNvPr>
+          <p:cNvSpPr txBox="1"/>
+          <p:nvPr/>
+        </p:nvSpPr>
+        <p:spPr>
+          <a:xfrm>
+            <a:off x="7958204" y="3996241"/>
+            <a:ext cx="369012" cy="246221"/>
+          </a:xfrm>
+          <a:prstGeom prst="rect">
+            <a:avLst/>
+          </a:prstGeom>
+          <a:noFill/>
+        </p:spPr>
+        <p:txBody>
+          <a:bodyPr wrap="none" rtlCol="0">
+            <a:spAutoFit/>
+          </a:bodyPr>
+          <a:lstStyle/>
+          <a:p>
+            <a:r>
+              <a:rPr lang="en-GB" sz="1000" dirty="0"/>
+              <a:t>YES</a:t>
+            </a:r>
+          </a:p>
+        </p:txBody>
+      </p:sp>
+      <p:cxnSp>
+        <p:nvCxnSpPr>
+          <p:cNvPr id="99" name="Straight Arrow Connector 98">
+            <a:extLst>
+              <a:ext uri="{FF2B5EF4-FFF2-40B4-BE49-F238E27FC236}">
+                <a16:creationId xmlns:a16="http://schemas.microsoft.com/office/drawing/2014/main" id="{71D48FD5-5975-01AB-C2C2-DD007BB71097}"/>
+              </a:ext>
+            </a:extLst>
+          </p:cNvPr>
+          <p:cNvCxnSpPr>
+            <a:cxnSpLocks/>
+          </p:cNvCxnSpPr>
+          <p:nvPr/>
+        </p:nvCxnSpPr>
+        <p:spPr>
+          <a:xfrm flipH="1">
+            <a:off x="7362615" y="3984695"/>
+            <a:ext cx="294090" cy="383699"/>
+          </a:xfrm>
+          <a:prstGeom prst="straightConnector1">
+            <a:avLst/>
+          </a:prstGeom>
+          <a:ln>
+            <a:solidFill>
+              <a:schemeClr val="tx1"/>
+            </a:solidFill>
+            <a:tailEnd type="triangle"/>
+          </a:ln>
+        </p:spPr>
+        <p:style>
+          <a:lnRef idx="1">
+            <a:schemeClr val="accent1"/>
+          </a:lnRef>
+          <a:fillRef idx="0">
+            <a:schemeClr val="accent1"/>
+          </a:fillRef>
+          <a:effectRef idx="0">
+            <a:schemeClr val="accent1"/>
+          </a:effectRef>
+          <a:fontRef idx="minor">
+            <a:schemeClr val="tx1"/>
+          </a:fontRef>
+        </p:style>
+      </p:cxnSp>
+      <p:sp>
+        <p:nvSpPr>
+          <p:cNvPr id="100" name="TextBox 99">
+            <a:extLst>
+              <a:ext uri="{FF2B5EF4-FFF2-40B4-BE49-F238E27FC236}">
+                <a16:creationId xmlns:a16="http://schemas.microsoft.com/office/drawing/2014/main" id="{875E2B1A-FE59-0B93-11A4-0F36B7815CD5}"/>
+              </a:ext>
+            </a:extLst>
+          </p:cNvPr>
+          <p:cNvSpPr txBox="1"/>
+          <p:nvPr/>
+        </p:nvSpPr>
+        <p:spPr>
+          <a:xfrm>
+            <a:off x="7226776" y="3980647"/>
+            <a:ext cx="352982" cy="246221"/>
+          </a:xfrm>
+          <a:prstGeom prst="rect">
+            <a:avLst/>
+          </a:prstGeom>
+          <a:noFill/>
+        </p:spPr>
+        <p:txBody>
+          <a:bodyPr wrap="none" rtlCol="0">
+            <a:spAutoFit/>
+          </a:bodyPr>
+          <a:lstStyle/>
+          <a:p>
+            <a:r>
+              <a:rPr lang="en-GB" sz="1000" dirty="0"/>
+              <a:t>NO</a:t>
+            </a:r>
+          </a:p>
+        </p:txBody>
+      </p:sp>
+      <p:sp>
+        <p:nvSpPr>
+          <p:cNvPr id="101" name="TextBox 100">
+            <a:extLst>
+              <a:ext uri="{FF2B5EF4-FFF2-40B4-BE49-F238E27FC236}">
+                <a16:creationId xmlns:a16="http://schemas.microsoft.com/office/drawing/2014/main" id="{2AC7C931-C89A-6F1C-99BA-28EB7196E2D9}"/>
+              </a:ext>
+            </a:extLst>
+          </p:cNvPr>
+          <p:cNvSpPr txBox="1"/>
+          <p:nvPr/>
+        </p:nvSpPr>
+        <p:spPr>
+          <a:xfrm flipV="1">
+            <a:off x="8097056" y="4460760"/>
+            <a:ext cx="352982" cy="369332"/>
+          </a:xfrm>
+          <a:prstGeom prst="rect">
+            <a:avLst/>
+          </a:prstGeom>
+          <a:noFill/>
+        </p:spPr>
+        <p:txBody>
+          <a:bodyPr wrap="square" rtlCol="0">
+            <a:spAutoFit/>
+          </a:bodyPr>
+          <a:lstStyle/>
+          <a:p>
+            <a:r>
+              <a:rPr lang="en-GB" dirty="0"/>
+              <a:t>…</a:t>
+            </a:r>
+          </a:p>
+        </p:txBody>
+      </p:sp>
+      <p:sp>
+        <p:nvSpPr>
+          <p:cNvPr id="102" name="TextBox 101">
+            <a:extLst>
+              <a:ext uri="{FF2B5EF4-FFF2-40B4-BE49-F238E27FC236}">
+                <a16:creationId xmlns:a16="http://schemas.microsoft.com/office/drawing/2014/main" id="{FAFA5DBE-26C4-B2FC-1859-2BBA9CE0DB52}"/>
+              </a:ext>
+            </a:extLst>
+          </p:cNvPr>
+          <p:cNvSpPr txBox="1"/>
+          <p:nvPr/>
+        </p:nvSpPr>
+        <p:spPr>
+          <a:xfrm flipV="1">
+            <a:off x="7226776" y="4478810"/>
+            <a:ext cx="352982" cy="369332"/>
+          </a:xfrm>
+          <a:prstGeom prst="rect">
+            <a:avLst/>
+          </a:prstGeom>
+          <a:noFill/>
+        </p:spPr>
+        <p:txBody>
+          <a:bodyPr wrap="square" rtlCol="0">
+            <a:spAutoFit/>
+          </a:bodyPr>
+          <a:lstStyle/>
+          <a:p>
+            <a:r>
+              <a:rPr lang="en-GB" dirty="0"/>
+              <a:t>…</a:t>
+            </a:r>
+          </a:p>
+        </p:txBody>
+      </p:sp>
+      <p:sp>
+        <p:nvSpPr>
+          <p:cNvPr id="103" name="TextBox 102">
+            <a:extLst>
+              <a:ext uri="{FF2B5EF4-FFF2-40B4-BE49-F238E27FC236}">
+                <a16:creationId xmlns:a16="http://schemas.microsoft.com/office/drawing/2014/main" id="{BA769F13-9357-DA7D-A280-CB5A2FF340DB}"/>
+              </a:ext>
+            </a:extLst>
+          </p:cNvPr>
+          <p:cNvSpPr txBox="1"/>
+          <p:nvPr/>
+        </p:nvSpPr>
+        <p:spPr>
+          <a:xfrm flipV="1">
+            <a:off x="8271935" y="3366741"/>
+            <a:ext cx="178103" cy="369332"/>
+          </a:xfrm>
+          <a:prstGeom prst="rect">
+            <a:avLst/>
+          </a:prstGeom>
+          <a:noFill/>
+        </p:spPr>
+        <p:txBody>
+          <a:bodyPr wrap="square" rtlCol="0">
+            <a:spAutoFit/>
+          </a:bodyPr>
+          <a:lstStyle/>
+          <a:p>
+            <a:r>
+              <a:rPr lang="en-GB" dirty="0"/>
+              <a:t>…</a:t>
+            </a:r>
+          </a:p>
+        </p:txBody>
+      </p:sp>
+      <p:cxnSp>
+        <p:nvCxnSpPr>
+          <p:cNvPr id="104" name="Straight Arrow Connector 103">
+            <a:extLst>
+              <a:ext uri="{FF2B5EF4-FFF2-40B4-BE49-F238E27FC236}">
+                <a16:creationId xmlns:a16="http://schemas.microsoft.com/office/drawing/2014/main" id="{65429DFA-2C64-1289-DE39-D6C8CE9A196D}"/>
+              </a:ext>
+            </a:extLst>
+          </p:cNvPr>
+          <p:cNvCxnSpPr>
+            <a:cxnSpLocks/>
+          </p:cNvCxnSpPr>
+          <p:nvPr/>
+        </p:nvCxnSpPr>
+        <p:spPr>
+          <a:xfrm>
+            <a:off x="9833058" y="3978394"/>
+            <a:ext cx="387396" cy="383699"/>
+          </a:xfrm>
+          <a:prstGeom prst="straightConnector1">
+            <a:avLst/>
+          </a:prstGeom>
+          <a:ln>
+            <a:solidFill>
+              <a:schemeClr val="tx1"/>
+            </a:solidFill>
+            <a:tailEnd type="triangle"/>
+          </a:ln>
+        </p:spPr>
+        <p:style>
+          <a:lnRef idx="1">
+            <a:schemeClr val="accent1"/>
+          </a:lnRef>
+          <a:fillRef idx="0">
+            <a:schemeClr val="accent1"/>
+          </a:fillRef>
+          <a:effectRef idx="0">
+            <a:schemeClr val="accent1"/>
+          </a:effectRef>
+          <a:fontRef idx="minor">
+            <a:schemeClr val="tx1"/>
+          </a:fontRef>
+        </p:style>
+      </p:cxnSp>
+      <p:sp>
+        <p:nvSpPr>
+          <p:cNvPr id="105" name="TextBox 104">
+            <a:extLst>
+              <a:ext uri="{FF2B5EF4-FFF2-40B4-BE49-F238E27FC236}">
+                <a16:creationId xmlns:a16="http://schemas.microsoft.com/office/drawing/2014/main" id="{B3377B8F-F389-FC59-DC41-EC9D68EFACE8}"/>
+              </a:ext>
+            </a:extLst>
+          </p:cNvPr>
+          <p:cNvSpPr txBox="1"/>
+          <p:nvPr/>
+        </p:nvSpPr>
+        <p:spPr>
+          <a:xfrm>
+            <a:off x="9933968" y="3978394"/>
+            <a:ext cx="369012" cy="246221"/>
+          </a:xfrm>
+          <a:prstGeom prst="rect">
+            <a:avLst/>
+          </a:prstGeom>
+          <a:noFill/>
+        </p:spPr>
+        <p:txBody>
+          <a:bodyPr wrap="none" rtlCol="0">
+            <a:spAutoFit/>
+          </a:bodyPr>
+          <a:lstStyle/>
+          <a:p>
+            <a:r>
+              <a:rPr lang="en-GB" sz="1000" dirty="0"/>
+              <a:t>YES</a:t>
+            </a:r>
+          </a:p>
+        </p:txBody>
+      </p:sp>
+      <p:cxnSp>
+        <p:nvCxnSpPr>
+          <p:cNvPr id="106" name="Straight Arrow Connector 105">
+            <a:extLst>
+              <a:ext uri="{FF2B5EF4-FFF2-40B4-BE49-F238E27FC236}">
+                <a16:creationId xmlns:a16="http://schemas.microsoft.com/office/drawing/2014/main" id="{B301DCAE-2401-B87C-B1D1-F03074DC33DF}"/>
+              </a:ext>
+            </a:extLst>
+          </p:cNvPr>
+          <p:cNvCxnSpPr>
+            <a:cxnSpLocks/>
+          </p:cNvCxnSpPr>
+          <p:nvPr/>
+        </p:nvCxnSpPr>
+        <p:spPr>
+          <a:xfrm flipH="1">
+            <a:off x="9381509" y="3966848"/>
+            <a:ext cx="294090" cy="383699"/>
+          </a:xfrm>
+          <a:prstGeom prst="straightConnector1">
+            <a:avLst/>
+          </a:prstGeom>
+          <a:ln>
+            <a:solidFill>
+              <a:schemeClr val="tx1"/>
+            </a:solidFill>
+            <a:tailEnd type="triangle"/>
+          </a:ln>
+        </p:spPr>
+        <p:style>
+          <a:lnRef idx="1">
+            <a:schemeClr val="accent1"/>
+          </a:lnRef>
+          <a:fillRef idx="0">
+            <a:schemeClr val="accent1"/>
+          </a:fillRef>
+          <a:effectRef idx="0">
+            <a:schemeClr val="accent1"/>
+          </a:effectRef>
+          <a:fontRef idx="minor">
+            <a:schemeClr val="tx1"/>
+          </a:fontRef>
+        </p:style>
+      </p:cxnSp>
+      <p:sp>
+        <p:nvSpPr>
+          <p:cNvPr id="107" name="TextBox 106">
+            <a:extLst>
+              <a:ext uri="{FF2B5EF4-FFF2-40B4-BE49-F238E27FC236}">
+                <a16:creationId xmlns:a16="http://schemas.microsoft.com/office/drawing/2014/main" id="{F6BEDDFF-D919-7A5A-D131-851912CC8CE0}"/>
+              </a:ext>
+            </a:extLst>
+          </p:cNvPr>
+          <p:cNvSpPr txBox="1"/>
+          <p:nvPr/>
+        </p:nvSpPr>
+        <p:spPr>
+          <a:xfrm>
+            <a:off x="9245670" y="3962800"/>
+            <a:ext cx="352982" cy="246221"/>
+          </a:xfrm>
+          <a:prstGeom prst="rect">
+            <a:avLst/>
+          </a:prstGeom>
+          <a:noFill/>
+        </p:spPr>
+        <p:txBody>
+          <a:bodyPr wrap="none" rtlCol="0">
+            <a:spAutoFit/>
+          </a:bodyPr>
+          <a:lstStyle/>
+          <a:p>
+            <a:r>
+              <a:rPr lang="en-GB" sz="1000" dirty="0"/>
+              <a:t>NO</a:t>
+            </a:r>
+          </a:p>
+        </p:txBody>
+      </p:sp>
+      <p:sp>
+        <p:nvSpPr>
+          <p:cNvPr id="108" name="TextBox 107">
+            <a:extLst>
+              <a:ext uri="{FF2B5EF4-FFF2-40B4-BE49-F238E27FC236}">
+                <a16:creationId xmlns:a16="http://schemas.microsoft.com/office/drawing/2014/main" id="{3F576154-7B87-6C66-48F1-675FDC78283B}"/>
+              </a:ext>
+            </a:extLst>
+          </p:cNvPr>
+          <p:cNvSpPr txBox="1"/>
+          <p:nvPr/>
+        </p:nvSpPr>
+        <p:spPr>
+          <a:xfrm flipV="1">
+            <a:off x="10072820" y="4442913"/>
+            <a:ext cx="352982" cy="369332"/>
+          </a:xfrm>
+          <a:prstGeom prst="rect">
+            <a:avLst/>
+          </a:prstGeom>
+          <a:noFill/>
+        </p:spPr>
+        <p:txBody>
+          <a:bodyPr wrap="square" rtlCol="0">
+            <a:spAutoFit/>
+          </a:bodyPr>
+          <a:lstStyle/>
+          <a:p>
+            <a:r>
+              <a:rPr lang="en-GB" dirty="0"/>
+              <a:t>…</a:t>
+            </a:r>
+          </a:p>
+        </p:txBody>
+      </p:sp>
+      <p:sp>
+        <p:nvSpPr>
+          <p:cNvPr id="109" name="TextBox 108">
+            <a:extLst>
+              <a:ext uri="{FF2B5EF4-FFF2-40B4-BE49-F238E27FC236}">
+                <a16:creationId xmlns:a16="http://schemas.microsoft.com/office/drawing/2014/main" id="{F90A8A43-640B-7E15-24FE-B4A211808596}"/>
+              </a:ext>
+            </a:extLst>
+          </p:cNvPr>
+          <p:cNvSpPr txBox="1"/>
+          <p:nvPr/>
+        </p:nvSpPr>
+        <p:spPr>
+          <a:xfrm flipV="1">
+            <a:off x="9245670" y="4460963"/>
+            <a:ext cx="352982" cy="369332"/>
+          </a:xfrm>
+          <a:prstGeom prst="rect">
+            <a:avLst/>
+          </a:prstGeom>
+          <a:noFill/>
+        </p:spPr>
+        <p:txBody>
+          <a:bodyPr wrap="square" rtlCol="0">
+            <a:spAutoFit/>
+          </a:bodyPr>
+          <a:lstStyle/>
+          <a:p>
+            <a:r>
+              <a:rPr lang="en-GB" dirty="0"/>
+              <a:t>…</a:t>
+            </a:r>
+          </a:p>
+        </p:txBody>
+      </p:sp>
+    </p:spTree>
+    <p:extLst>
+      <p:ext uri="{BB962C8B-B14F-4D97-AF65-F5344CB8AC3E}">
+        <p14:creationId xmlns:p14="http://schemas.microsoft.com/office/powerpoint/2010/main" val="1391884627"/>
+      </p:ext>
+    </p:extLst>
+  </p:cSld>
+  <p:clrMapOvr>
+    <a:masterClrMapping/>
+  </p:clrMapOvr>
+</p:sld>
+</file>
+
 <file path=ppt/theme/theme1.xml><?xml version="1.0" encoding="utf-8"?>
 <a:theme xmlns:a="http://schemas.openxmlformats.org/drawingml/2006/main" name="Office Theme">
   <a:themeElements>

</xml_diff>

<commit_message>
Updated research with latest results
</commit_message>
<xml_diff>
--- a/Results April7-2023/Documentation/diagrams.pptx
+++ b/Results April7-2023/Documentation/diagrams.pptx
@@ -261,7 +261,7 @@
           <a:p>
             <a:fld id="{C65DFA68-ED05-459F-A67B-C3167FA5D309}" type="datetimeFigureOut">
               <a:rPr lang="en-GB" smtClean="0"/>
-              <a:t>13/05/2023</a:t>
+              <a:t>14/05/2023</a:t>
             </a:fld>
             <a:endParaRPr lang="en-GB"/>
           </a:p>
@@ -459,7 +459,7 @@
           <a:p>
             <a:fld id="{C65DFA68-ED05-459F-A67B-C3167FA5D309}" type="datetimeFigureOut">
               <a:rPr lang="en-GB" smtClean="0"/>
-              <a:t>13/05/2023</a:t>
+              <a:t>14/05/2023</a:t>
             </a:fld>
             <a:endParaRPr lang="en-GB"/>
           </a:p>
@@ -667,7 +667,7 @@
           <a:p>
             <a:fld id="{C65DFA68-ED05-459F-A67B-C3167FA5D309}" type="datetimeFigureOut">
               <a:rPr lang="en-GB" smtClean="0"/>
-              <a:t>13/05/2023</a:t>
+              <a:t>14/05/2023</a:t>
             </a:fld>
             <a:endParaRPr lang="en-GB"/>
           </a:p>
@@ -865,7 +865,7 @@
           <a:p>
             <a:fld id="{C65DFA68-ED05-459F-A67B-C3167FA5D309}" type="datetimeFigureOut">
               <a:rPr lang="en-GB" smtClean="0"/>
-              <a:t>13/05/2023</a:t>
+              <a:t>14/05/2023</a:t>
             </a:fld>
             <a:endParaRPr lang="en-GB"/>
           </a:p>
@@ -1140,7 +1140,7 @@
           <a:p>
             <a:fld id="{C65DFA68-ED05-459F-A67B-C3167FA5D309}" type="datetimeFigureOut">
               <a:rPr lang="en-GB" smtClean="0"/>
-              <a:t>13/05/2023</a:t>
+              <a:t>14/05/2023</a:t>
             </a:fld>
             <a:endParaRPr lang="en-GB"/>
           </a:p>
@@ -1405,7 +1405,7 @@
           <a:p>
             <a:fld id="{C65DFA68-ED05-459F-A67B-C3167FA5D309}" type="datetimeFigureOut">
               <a:rPr lang="en-GB" smtClean="0"/>
-              <a:t>13/05/2023</a:t>
+              <a:t>14/05/2023</a:t>
             </a:fld>
             <a:endParaRPr lang="en-GB"/>
           </a:p>
@@ -1817,7 +1817,7 @@
           <a:p>
             <a:fld id="{C65DFA68-ED05-459F-A67B-C3167FA5D309}" type="datetimeFigureOut">
               <a:rPr lang="en-GB" smtClean="0"/>
-              <a:t>13/05/2023</a:t>
+              <a:t>14/05/2023</a:t>
             </a:fld>
             <a:endParaRPr lang="en-GB"/>
           </a:p>
@@ -1958,7 +1958,7 @@
           <a:p>
             <a:fld id="{C65DFA68-ED05-459F-A67B-C3167FA5D309}" type="datetimeFigureOut">
               <a:rPr lang="en-GB" smtClean="0"/>
-              <a:t>13/05/2023</a:t>
+              <a:t>14/05/2023</a:t>
             </a:fld>
             <a:endParaRPr lang="en-GB"/>
           </a:p>
@@ -2071,7 +2071,7 @@
           <a:p>
             <a:fld id="{C65DFA68-ED05-459F-A67B-C3167FA5D309}" type="datetimeFigureOut">
               <a:rPr lang="en-GB" smtClean="0"/>
-              <a:t>13/05/2023</a:t>
+              <a:t>14/05/2023</a:t>
             </a:fld>
             <a:endParaRPr lang="en-GB"/>
           </a:p>
@@ -2382,7 +2382,7 @@
           <a:p>
             <a:fld id="{C65DFA68-ED05-459F-A67B-C3167FA5D309}" type="datetimeFigureOut">
               <a:rPr lang="en-GB" smtClean="0"/>
-              <a:t>13/05/2023</a:t>
+              <a:t>14/05/2023</a:t>
             </a:fld>
             <a:endParaRPr lang="en-GB"/>
           </a:p>
@@ -2670,7 +2670,7 @@
           <a:p>
             <a:fld id="{C65DFA68-ED05-459F-A67B-C3167FA5D309}" type="datetimeFigureOut">
               <a:rPr lang="en-GB" smtClean="0"/>
-              <a:t>13/05/2023</a:t>
+              <a:t>14/05/2023</a:t>
             </a:fld>
             <a:endParaRPr lang="en-GB"/>
           </a:p>
@@ -2911,7 +2911,7 @@
           <a:p>
             <a:fld id="{C65DFA68-ED05-459F-A67B-C3167FA5D309}" type="datetimeFigureOut">
               <a:rPr lang="en-GB" smtClean="0"/>
-              <a:t>13/05/2023</a:t>
+              <a:t>14/05/2023</a:t>
             </a:fld>
             <a:endParaRPr lang="en-GB"/>
           </a:p>
@@ -5235,7 +5235,7 @@
         </p:nvSpPr>
         <p:spPr>
           <a:xfrm>
-            <a:off x="5217783" y="413714"/>
+            <a:off x="5103638" y="308272"/>
             <a:ext cx="1311653" cy="520549"/>
           </a:xfrm>
           <a:prstGeom prst="ellipse">
@@ -5307,7 +5307,7 @@
         </p:nvCxnSpPr>
         <p:spPr>
           <a:xfrm flipH="1">
-            <a:off x="5279367" y="992742"/>
+            <a:off x="4821042" y="871097"/>
             <a:ext cx="294090" cy="383699"/>
           </a:xfrm>
           <a:prstGeom prst="straightConnector1">
@@ -5351,7 +5351,7 @@
         </p:nvCxnSpPr>
         <p:spPr>
           <a:xfrm>
-            <a:off x="6234566" y="998949"/>
+            <a:off x="6494715" y="835151"/>
             <a:ext cx="387396" cy="383699"/>
           </a:xfrm>
           <a:prstGeom prst="straightConnector1">
@@ -5393,7 +5393,7 @@
         </p:nvSpPr>
         <p:spPr>
           <a:xfrm>
-            <a:off x="6335476" y="998949"/>
+            <a:off x="6595625" y="835151"/>
             <a:ext cx="369012" cy="246221"/>
           </a:xfrm>
           <a:prstGeom prst="rect">
@@ -5428,7 +5428,7 @@
         </p:nvSpPr>
         <p:spPr>
           <a:xfrm>
-            <a:off x="5146618" y="1009994"/>
+            <a:off x="4688293" y="888349"/>
             <a:ext cx="352982" cy="246221"/>
           </a:xfrm>
           <a:prstGeom prst="rect">
@@ -7447,7 +7447,7 @@
         </p:nvCxnSpPr>
         <p:spPr>
           <a:xfrm>
-            <a:off x="7473194" y="1929898"/>
+            <a:off x="7637909" y="1896990"/>
             <a:ext cx="387396" cy="383699"/>
           </a:xfrm>
           <a:prstGeom prst="straightConnector1">
@@ -7489,7 +7489,7 @@
         </p:nvSpPr>
         <p:spPr>
           <a:xfrm>
-            <a:off x="7574104" y="1929898"/>
+            <a:off x="7738819" y="1896990"/>
             <a:ext cx="369012" cy="246221"/>
           </a:xfrm>
           <a:prstGeom prst="rect">
@@ -7596,7 +7596,7 @@
         </p:nvCxnSpPr>
         <p:spPr>
           <a:xfrm>
-            <a:off x="8884089" y="2860948"/>
+            <a:off x="8768164" y="2904543"/>
             <a:ext cx="387396" cy="383699"/>
           </a:xfrm>
           <a:prstGeom prst="straightConnector1">
@@ -7638,7 +7638,7 @@
         </p:nvSpPr>
         <p:spPr>
           <a:xfrm>
-            <a:off x="8984999" y="2860948"/>
+            <a:off x="8869074" y="2904543"/>
             <a:ext cx="369012" cy="246221"/>
           </a:xfrm>
           <a:prstGeom prst="rect">
@@ -7647,7 +7647,7 @@
           <a:noFill/>
         </p:spPr>
         <p:txBody>
-          <a:bodyPr wrap="none" rtlCol="0">
+          <a:bodyPr wrap="square" rtlCol="0">
             <a:spAutoFit/>
           </a:bodyPr>
           <a:lstStyle/>
@@ -8361,7 +8361,7 @@
         </p:nvSpPr>
         <p:spPr>
           <a:xfrm flipV="1">
-            <a:off x="5729807" y="4470853"/>
+            <a:off x="5729531" y="4334404"/>
             <a:ext cx="352982" cy="369332"/>
           </a:xfrm>
           <a:prstGeom prst="rect">
@@ -8396,7 +8396,7 @@
         </p:nvSpPr>
         <p:spPr>
           <a:xfrm flipV="1">
-            <a:off x="6652933" y="4470853"/>
+            <a:off x="6671334" y="4334404"/>
             <a:ext cx="352982" cy="369332"/>
           </a:xfrm>
           <a:prstGeom prst="rect">
@@ -8433,7 +8433,7 @@
         </p:nvCxnSpPr>
         <p:spPr>
           <a:xfrm flipH="1">
-            <a:off x="8359148" y="2910147"/>
+            <a:off x="8097056" y="2909044"/>
             <a:ext cx="294090" cy="383699"/>
           </a:xfrm>
           <a:prstGeom prst="straightConnector1">
@@ -8475,7 +8475,7 @@
         </p:nvSpPr>
         <p:spPr>
           <a:xfrm>
-            <a:off x="8223309" y="2906099"/>
+            <a:off x="7961217" y="2904996"/>
             <a:ext cx="352982" cy="246221"/>
           </a:xfrm>
           <a:prstGeom prst="rect">
@@ -8668,7 +8668,7 @@
         </p:nvSpPr>
         <p:spPr>
           <a:xfrm flipV="1">
-            <a:off x="8097056" y="4460760"/>
+            <a:off x="8147788" y="4334404"/>
             <a:ext cx="352982" cy="369332"/>
           </a:xfrm>
           <a:prstGeom prst="rect">
@@ -8703,7 +8703,7 @@
         </p:nvSpPr>
         <p:spPr>
           <a:xfrm flipV="1">
-            <a:off x="7226776" y="4478810"/>
+            <a:off x="7151652" y="4334404"/>
             <a:ext cx="352982" cy="369332"/>
           </a:xfrm>
           <a:prstGeom prst="rect">
@@ -8738,7 +8738,7 @@
         </p:nvSpPr>
         <p:spPr>
           <a:xfrm flipV="1">
-            <a:off x="8271935" y="3366741"/>
+            <a:off x="8071290" y="3236201"/>
             <a:ext cx="178103" cy="369332"/>
           </a:xfrm>
           <a:prstGeom prst="rect">
@@ -8931,7 +8931,7 @@
         </p:nvSpPr>
         <p:spPr>
           <a:xfrm flipV="1">
-            <a:off x="10072820" y="4442913"/>
+            <a:off x="10126489" y="4334404"/>
             <a:ext cx="352982" cy="369332"/>
           </a:xfrm>
           <a:prstGeom prst="rect">
@@ -8966,7 +8966,7 @@
         </p:nvSpPr>
         <p:spPr>
           <a:xfrm flipV="1">
-            <a:off x="9245670" y="4460963"/>
+            <a:off x="9195057" y="4334404"/>
             <a:ext cx="352982" cy="369332"/>
           </a:xfrm>
           <a:prstGeom prst="rect">

</xml_diff>